<commit_message>
TACL and more GeoQuery data
</commit_message>
<xml_diff>
--- a/dnnQuery3.pptx
+++ b/dnnQuery3.pptx
@@ -216,7 +216,7 @@
           <a:p>
             <a:fld id="{6C69AF8A-8554-D74B-B8C7-B6347E590D19}" type="datetimeFigureOut">
               <a:rPr lang="en-US" smtClean="0"/>
-              <a:t>5/31/17</a:t>
+              <a:t>6/12/17</a:t>
             </a:fld>
             <a:endParaRPr lang="en-US"/>
           </a:p>
@@ -528,146 +528,6 @@
           <a:bodyPr/>
           <a:lstStyle/>
           <a:p>
-            <a:r>
-              <a:rPr lang="zh-CN" altLang="en-US" dirty="0" smtClean="0"/>
-              <a:t>还是先</a:t>
-            </a:r>
-            <a:r>
-              <a:rPr lang="en-US" altLang="zh-CN" dirty="0" smtClean="0"/>
-              <a:t>tag</a:t>
-            </a:r>
-            <a:r>
-              <a:rPr lang="zh-CN" altLang="en-US" dirty="0" smtClean="0"/>
-              <a:t>成统一的</a:t>
-            </a:r>
-            <a:r>
-              <a:rPr lang="en-US" altLang="zh-CN" dirty="0" smtClean="0"/>
-              <a:t>field</a:t>
-            </a:r>
-            <a:r>
-              <a:rPr lang="zh-CN" altLang="en-US" dirty="0" smtClean="0"/>
-              <a:t> </a:t>
-            </a:r>
-            <a:r>
-              <a:rPr lang="en-US" altLang="zh-CN" dirty="0" smtClean="0"/>
-              <a:t>name</a:t>
-            </a:r>
-            <a:r>
-              <a:rPr lang="zh-CN" altLang="en-US" dirty="0" smtClean="0">
-                <a:sym typeface="Wingdings"/>
-              </a:rPr>
-              <a:t>：</a:t>
-            </a:r>
-            <a:r>
-              <a:rPr lang="en-US" altLang="zh-CN" dirty="0" smtClean="0">
-                <a:sym typeface="Wingdings"/>
-              </a:rPr>
-              <a:t>[Nation,</a:t>
-            </a:r>
-            <a:r>
-              <a:rPr lang="zh-CN" altLang="en-US" dirty="0" smtClean="0">
-                <a:sym typeface="Wingdings"/>
-              </a:rPr>
-              <a:t> </a:t>
-            </a:r>
-            <a:r>
-              <a:rPr lang="en-US" altLang="zh-CN" dirty="0" smtClean="0">
-                <a:sym typeface="Wingdings"/>
-              </a:rPr>
-              <a:t>Rank</a:t>
-            </a:r>
-            <a:r>
-              <a:rPr lang="mr-IN" altLang="zh-CN" dirty="0" smtClean="0">
-                <a:sym typeface="Wingdings"/>
-              </a:rPr>
-              <a:t>…</a:t>
-            </a:r>
-            <a:r>
-              <a:rPr lang="en-US" altLang="zh-CN" dirty="0" smtClean="0">
-                <a:sym typeface="Wingdings"/>
-              </a:rPr>
-              <a:t>]</a:t>
-            </a:r>
-            <a:r>
-              <a:rPr lang="zh-CN" altLang="en-US" dirty="0" smtClean="0">
-                <a:sym typeface="Wingdings"/>
-              </a:rPr>
-              <a:t>，</a:t>
-            </a:r>
-            <a:r>
-              <a:rPr lang="zh-CN" altLang="en-US" baseline="0" dirty="0" smtClean="0">
-                <a:sym typeface="Wingdings"/>
-              </a:rPr>
-              <a:t>这样可以大致清楚都有什么</a:t>
-            </a:r>
-            <a:r>
-              <a:rPr lang="en-US" altLang="zh-CN" baseline="0" dirty="0" smtClean="0">
-                <a:sym typeface="Wingdings"/>
-              </a:rPr>
-              <a:t>fields</a:t>
-            </a:r>
-            <a:r>
-              <a:rPr lang="zh-CN" altLang="en-US" baseline="0" dirty="0" smtClean="0">
-                <a:sym typeface="Wingdings"/>
-              </a:rPr>
-              <a:t>，然后再</a:t>
-            </a:r>
-            <a:r>
-              <a:rPr lang="en-US" altLang="zh-CN" baseline="0" dirty="0" smtClean="0">
-                <a:sym typeface="Wingdings"/>
-              </a:rPr>
-              <a:t>label</a:t>
-            </a:r>
-            <a:r>
-              <a:rPr lang="zh-CN" altLang="en-US" baseline="0" dirty="0" smtClean="0">
-                <a:sym typeface="Wingdings"/>
-              </a:rPr>
-              <a:t> </a:t>
-            </a:r>
-            <a:r>
-              <a:rPr lang="en-US" altLang="zh-CN" baseline="0" dirty="0" err="1" smtClean="0">
-                <a:sym typeface="Wingdings"/>
-              </a:rPr>
-              <a:t>shown_up</a:t>
-            </a:r>
-            <a:r>
-              <a:rPr lang="zh-CN" altLang="en-US" baseline="0" dirty="0" smtClean="0">
-                <a:sym typeface="Wingdings"/>
-              </a:rPr>
-              <a:t> </a:t>
-            </a:r>
-            <a:r>
-              <a:rPr lang="en-US" altLang="zh-CN" baseline="0" dirty="0" smtClean="0">
-                <a:sym typeface="Wingdings"/>
-              </a:rPr>
-              <a:t>id</a:t>
-            </a:r>
-          </a:p>
-          <a:p>
-            <a:r>
-              <a:rPr lang="zh-CN" altLang="en-US" baseline="0" dirty="0" smtClean="0">
-                <a:sym typeface="Wingdings"/>
-              </a:rPr>
-              <a:t>对于每一个发现的</a:t>
-            </a:r>
-            <a:r>
-              <a:rPr lang="en-US" altLang="zh-CN" baseline="0" dirty="0" smtClean="0">
-                <a:sym typeface="Wingdings"/>
-              </a:rPr>
-              <a:t>value</a:t>
-            </a:r>
-            <a:r>
-              <a:rPr lang="zh-CN" altLang="en-US" baseline="0" dirty="0" smtClean="0">
-                <a:sym typeface="Wingdings"/>
-              </a:rPr>
-              <a:t>，都要确定其对应的</a:t>
-            </a:r>
-            <a:r>
-              <a:rPr lang="en-US" altLang="zh-CN" baseline="0" dirty="0" smtClean="0">
-                <a:sym typeface="Wingdings"/>
-              </a:rPr>
-              <a:t>field</a:t>
-            </a:r>
             <a:endParaRPr lang="en-US" dirty="0"/>
           </a:p>
         </p:txBody>
@@ -689,7 +549,7 @@
           <a:p>
             <a:fld id="{F462D47B-A527-614C-BCC4-5E0D5E97ED78}" type="slidenum">
               <a:rPr lang="en-US" smtClean="0"/>
-              <a:t>6</a:t>
+              <a:t>5</a:t>
             </a:fld>
             <a:endParaRPr lang="en-US"/>
           </a:p>
@@ -698,7 +558,100 @@
     </p:spTree>
     <p:extLst>
       <p:ext uri="{BB962C8B-B14F-4D97-AF65-F5344CB8AC3E}">
-        <p14:creationId xmlns:p14="http://schemas.microsoft.com/office/powerpoint/2010/main" val="1592011475"/>
+        <p14:creationId xmlns:p14="http://schemas.microsoft.com/office/powerpoint/2010/main" val="35029259"/>
+      </p:ext>
+    </p:extLst>
+  </p:cSld>
+  <p:clrMapOvr>
+    <a:masterClrMapping/>
+  </p:clrMapOvr>
+</p:notes>
+</file>
+
+<file path=ppt/notesSlides/notesSlide10.xml><?xml version="1.0" encoding="utf-8"?>
+<p:notes xmlns:a="http://schemas.openxmlformats.org/drawingml/2006/main" xmlns:r="http://schemas.openxmlformats.org/officeDocument/2006/relationships" xmlns:p="http://schemas.openxmlformats.org/presentationml/2006/main">
+  <p:cSld>
+    <p:spTree>
+      <p:nvGrpSpPr>
+        <p:cNvPr id="1" name=""/>
+        <p:cNvGrpSpPr/>
+        <p:nvPr/>
+      </p:nvGrpSpPr>
+      <p:grpSpPr>
+        <a:xfrm>
+          <a:off x="0" y="0"/>
+          <a:ext cx="0" cy="0"/>
+          <a:chOff x="0" y="0"/>
+          <a:chExt cx="0" cy="0"/>
+        </a:xfrm>
+      </p:grpSpPr>
+      <p:sp>
+        <p:nvSpPr>
+          <p:cNvPr id="2" name="Slide Image Placeholder 1"/>
+          <p:cNvSpPr>
+            <a:spLocks noGrp="1" noRot="1" noChangeAspect="1"/>
+          </p:cNvSpPr>
+          <p:nvPr>
+            <p:ph type="sldImg"/>
+          </p:nvPr>
+        </p:nvSpPr>
+        <p:spPr>
+          <a:xfrm>
+            <a:off x="685800" y="1143000"/>
+            <a:ext cx="5486400" cy="3086100"/>
+          </a:xfrm>
+        </p:spPr>
+      </p:sp>
+      <p:sp>
+        <p:nvSpPr>
+          <p:cNvPr id="3" name="Notes Placeholder 2"/>
+          <p:cNvSpPr>
+            <a:spLocks noGrp="1"/>
+          </p:cNvSpPr>
+          <p:nvPr>
+            <p:ph type="body" idx="1"/>
+          </p:nvPr>
+        </p:nvSpPr>
+        <p:spPr/>
+        <p:txBody>
+          <a:bodyPr/>
+          <a:lstStyle/>
+          <a:p>
+            <a:r>
+              <a:rPr lang="en-US" dirty="0" smtClean="0"/>
+              <a:t>Attention-based seq2seq DNN</a:t>
+            </a:r>
+            <a:endParaRPr lang="en-US" dirty="0"/>
+          </a:p>
+        </p:txBody>
+      </p:sp>
+      <p:sp>
+        <p:nvSpPr>
+          <p:cNvPr id="4" name="Slide Number Placeholder 3"/>
+          <p:cNvSpPr>
+            <a:spLocks noGrp="1"/>
+          </p:cNvSpPr>
+          <p:nvPr>
+            <p:ph type="sldNum" sz="quarter" idx="10"/>
+          </p:nvPr>
+        </p:nvSpPr>
+        <p:spPr/>
+        <p:txBody>
+          <a:bodyPr/>
+          <a:lstStyle/>
+          <a:p>
+            <a:fld id="{F462D47B-A527-614C-BCC4-5E0D5E97ED78}" type="slidenum">
+              <a:rPr lang="en-US" smtClean="0"/>
+              <a:t>16</a:t>
+            </a:fld>
+            <a:endParaRPr lang="en-US"/>
+          </a:p>
+        </p:txBody>
+      </p:sp>
+    </p:spTree>
+    <p:extLst>
+      <p:ext uri="{BB962C8B-B14F-4D97-AF65-F5344CB8AC3E}">
+        <p14:creationId xmlns:p14="http://schemas.microsoft.com/office/powerpoint/2010/main" val="1695039058"/>
       </p:ext>
     </p:extLst>
   </p:cSld>
@@ -913,7 +866,7 @@
           <a:p>
             <a:fld id="{F462D47B-A527-614C-BCC4-5E0D5E97ED78}" type="slidenum">
               <a:rPr lang="en-US" smtClean="0"/>
-              <a:t>7</a:t>
+              <a:t>6</a:t>
             </a:fld>
             <a:endParaRPr lang="en-US"/>
           </a:p>
@@ -922,7 +875,7 @@
     </p:spTree>
     <p:extLst>
       <p:ext uri="{BB962C8B-B14F-4D97-AF65-F5344CB8AC3E}">
-        <p14:creationId xmlns:p14="http://schemas.microsoft.com/office/powerpoint/2010/main" val="1383577003"/>
+        <p14:creationId xmlns:p14="http://schemas.microsoft.com/office/powerpoint/2010/main" val="1592011475"/>
       </p:ext>
     </p:extLst>
   </p:cSld>
@@ -976,40 +929,147 @@
           <a:bodyPr/>
           <a:lstStyle/>
           <a:p>
-            <a:pPr marL="0" marR="0" indent="0" algn="l" defTabSz="914400" rtl="0" eaLnBrk="1" fontAlgn="auto" latinLnBrk="0" hangingPunct="1">
-              <a:lnSpc>
-                <a:spcPct val="100000"/>
-              </a:lnSpc>
-              <a:spcBef>
-                <a:spcPts val="0"/>
-              </a:spcBef>
-              <a:spcAft>
-                <a:spcPts val="0"/>
-              </a:spcAft>
-              <a:buClrTx/>
-              <a:buSzTx/>
-              <a:buFontTx/>
-              <a:buNone/>
-              <a:tabLst/>
-              <a:defRPr/>
-            </a:pPr>
             <a:r>
               <a:rPr lang="zh-CN" altLang="en-US" dirty="0" smtClean="0"/>
-              <a:t>后期</a:t>
+              <a:t>还是先</a:t>
             </a:r>
             <a:r>
               <a:rPr lang="en-US" altLang="zh-CN" dirty="0" smtClean="0"/>
-              <a:t>adding</a:t>
+              <a:t>tag</a:t>
             </a:r>
             <a:r>
               <a:rPr lang="zh-CN" altLang="en-US" dirty="0" smtClean="0"/>
-              <a:t>新的句子和问答方式：</a:t>
+              <a:t>成统一的</a:t>
             </a:r>
             <a:r>
               <a:rPr lang="en-US" altLang="zh-CN" dirty="0" smtClean="0"/>
-              <a:t>small fields with {possible paraphrases}</a:t>
-            </a:r>
-            <a:endParaRPr lang="en-US" dirty="0" smtClean="0"/>
+              <a:t>field</a:t>
+            </a:r>
+            <a:r>
+              <a:rPr lang="zh-CN" altLang="en-US" dirty="0" smtClean="0"/>
+              <a:t> </a:t>
+            </a:r>
+            <a:r>
+              <a:rPr lang="en-US" altLang="zh-CN" dirty="0" smtClean="0"/>
+              <a:t>name</a:t>
+            </a:r>
+            <a:r>
+              <a:rPr lang="zh-CN" altLang="en-US" dirty="0" smtClean="0">
+                <a:sym typeface="Wingdings"/>
+              </a:rPr>
+              <a:t>：</a:t>
+            </a:r>
+            <a:r>
+              <a:rPr lang="en-US" altLang="zh-CN" dirty="0" smtClean="0">
+                <a:sym typeface="Wingdings"/>
+              </a:rPr>
+              <a:t>[Nation,</a:t>
+            </a:r>
+            <a:r>
+              <a:rPr lang="zh-CN" altLang="en-US" dirty="0" smtClean="0">
+                <a:sym typeface="Wingdings"/>
+              </a:rPr>
+              <a:t> </a:t>
+            </a:r>
+            <a:r>
+              <a:rPr lang="en-US" altLang="zh-CN" dirty="0" smtClean="0">
+                <a:sym typeface="Wingdings"/>
+              </a:rPr>
+              <a:t>Rank</a:t>
+            </a:r>
+            <a:r>
+              <a:rPr lang="mr-IN" altLang="zh-CN" dirty="0" smtClean="0">
+                <a:sym typeface="Wingdings"/>
+              </a:rPr>
+              <a:t>…</a:t>
+            </a:r>
+            <a:r>
+              <a:rPr lang="en-US" altLang="zh-CN" dirty="0" smtClean="0">
+                <a:sym typeface="Wingdings"/>
+              </a:rPr>
+              <a:t>]</a:t>
+            </a:r>
+            <a:r>
+              <a:rPr lang="zh-CN" altLang="en-US" dirty="0" smtClean="0">
+                <a:sym typeface="Wingdings"/>
+              </a:rPr>
+              <a:t>，</a:t>
+            </a:r>
+            <a:r>
+              <a:rPr lang="zh-CN" altLang="en-US" baseline="0" dirty="0" smtClean="0">
+                <a:sym typeface="Wingdings"/>
+              </a:rPr>
+              <a:t>这样可以大致清楚都有什么</a:t>
+            </a:r>
+            <a:r>
+              <a:rPr lang="en-US" altLang="zh-CN" baseline="0" dirty="0" smtClean="0">
+                <a:sym typeface="Wingdings"/>
+              </a:rPr>
+              <a:t>fields</a:t>
+            </a:r>
+            <a:r>
+              <a:rPr lang="zh-CN" altLang="en-US" baseline="0" dirty="0" smtClean="0">
+                <a:sym typeface="Wingdings"/>
+              </a:rPr>
+              <a:t>，然后再</a:t>
+            </a:r>
+            <a:r>
+              <a:rPr lang="en-US" altLang="zh-CN" baseline="0" dirty="0" smtClean="0">
+                <a:sym typeface="Wingdings"/>
+              </a:rPr>
+              <a:t>label</a:t>
+            </a:r>
+            <a:r>
+              <a:rPr lang="zh-CN" altLang="en-US" baseline="0" dirty="0" smtClean="0">
+                <a:sym typeface="Wingdings"/>
+              </a:rPr>
+              <a:t> </a:t>
+            </a:r>
+            <a:r>
+              <a:rPr lang="en-US" altLang="zh-CN" baseline="0" dirty="0" err="1" smtClean="0">
+                <a:sym typeface="Wingdings"/>
+              </a:rPr>
+              <a:t>shown_up</a:t>
+            </a:r>
+            <a:r>
+              <a:rPr lang="zh-CN" altLang="en-US" baseline="0" dirty="0" smtClean="0">
+                <a:sym typeface="Wingdings"/>
+              </a:rPr>
+              <a:t> </a:t>
+            </a:r>
+            <a:r>
+              <a:rPr lang="en-US" altLang="zh-CN" baseline="0" dirty="0" smtClean="0">
+                <a:sym typeface="Wingdings"/>
+              </a:rPr>
+              <a:t>id</a:t>
+            </a:r>
+          </a:p>
+          <a:p>
+            <a:r>
+              <a:rPr lang="zh-CN" altLang="en-US" baseline="0" dirty="0" smtClean="0">
+                <a:sym typeface="Wingdings"/>
+              </a:rPr>
+              <a:t>对于每一个发现的</a:t>
+            </a:r>
+            <a:r>
+              <a:rPr lang="en-US" altLang="zh-CN" baseline="0" dirty="0" smtClean="0">
+                <a:sym typeface="Wingdings"/>
+              </a:rPr>
+              <a:t>value</a:t>
+            </a:r>
+            <a:r>
+              <a:rPr lang="zh-CN" altLang="en-US" baseline="0" dirty="0" smtClean="0">
+                <a:sym typeface="Wingdings"/>
+              </a:rPr>
+              <a:t>，都要确定其对应的</a:t>
+            </a:r>
+            <a:r>
+              <a:rPr lang="en-US" altLang="zh-CN" baseline="0" dirty="0" smtClean="0">
+                <a:sym typeface="Wingdings"/>
+              </a:rPr>
+              <a:t>field</a:t>
+            </a:r>
+            <a:endParaRPr lang="en-US" dirty="0"/>
           </a:p>
         </p:txBody>
       </p:sp>
@@ -1030,7 +1090,7 @@
           <a:p>
             <a:fld id="{F462D47B-A527-614C-BCC4-5E0D5E97ED78}" type="slidenum">
               <a:rPr lang="en-US" smtClean="0"/>
-              <a:t>9</a:t>
+              <a:t>7</a:t>
             </a:fld>
             <a:endParaRPr lang="en-US"/>
           </a:p>
@@ -1039,7 +1099,7 @@
     </p:spTree>
     <p:extLst>
       <p:ext uri="{BB962C8B-B14F-4D97-AF65-F5344CB8AC3E}">
-        <p14:creationId xmlns:p14="http://schemas.microsoft.com/office/powerpoint/2010/main" val="40941409"/>
+        <p14:creationId xmlns:p14="http://schemas.microsoft.com/office/powerpoint/2010/main" val="1383577003"/>
       </p:ext>
     </p:extLst>
   </p:cSld>
@@ -1093,147 +1153,40 @@
           <a:bodyPr/>
           <a:lstStyle/>
           <a:p>
+            <a:pPr marL="0" marR="0" indent="0" algn="l" defTabSz="914400" rtl="0" eaLnBrk="1" fontAlgn="auto" latinLnBrk="0" hangingPunct="1">
+              <a:lnSpc>
+                <a:spcPct val="100000"/>
+              </a:lnSpc>
+              <a:spcBef>
+                <a:spcPts val="0"/>
+              </a:spcBef>
+              <a:spcAft>
+                <a:spcPts val="0"/>
+              </a:spcAft>
+              <a:buClrTx/>
+              <a:buSzTx/>
+              <a:buFontTx/>
+              <a:buNone/>
+              <a:tabLst/>
+              <a:defRPr/>
+            </a:pPr>
             <a:r>
               <a:rPr lang="zh-CN" altLang="en-US" dirty="0" smtClean="0"/>
-              <a:t>还是先</a:t>
+              <a:t>后期</a:t>
             </a:r>
             <a:r>
               <a:rPr lang="en-US" altLang="zh-CN" dirty="0" smtClean="0"/>
-              <a:t>tag</a:t>
+              <a:t>adding</a:t>
             </a:r>
             <a:r>
               <a:rPr lang="zh-CN" altLang="en-US" dirty="0" smtClean="0"/>
-              <a:t>成统一的</a:t>
+              <a:t>新的句子和问答方式：</a:t>
             </a:r>
             <a:r>
               <a:rPr lang="en-US" altLang="zh-CN" dirty="0" smtClean="0"/>
-              <a:t>field</a:t>
-            </a:r>
-            <a:r>
-              <a:rPr lang="zh-CN" altLang="en-US" dirty="0" smtClean="0"/>
-              <a:t> </a:t>
-            </a:r>
-            <a:r>
-              <a:rPr lang="en-US" altLang="zh-CN" dirty="0" smtClean="0"/>
-              <a:t>name</a:t>
-            </a:r>
-            <a:r>
-              <a:rPr lang="zh-CN" altLang="en-US" dirty="0" smtClean="0">
-                <a:sym typeface="Wingdings"/>
-              </a:rPr>
-              <a:t>：</a:t>
-            </a:r>
-            <a:r>
-              <a:rPr lang="en-US" altLang="zh-CN" dirty="0" smtClean="0">
-                <a:sym typeface="Wingdings"/>
-              </a:rPr>
-              <a:t>[Nation,</a:t>
-            </a:r>
-            <a:r>
-              <a:rPr lang="zh-CN" altLang="en-US" dirty="0" smtClean="0">
-                <a:sym typeface="Wingdings"/>
-              </a:rPr>
-              <a:t> </a:t>
-            </a:r>
-            <a:r>
-              <a:rPr lang="en-US" altLang="zh-CN" dirty="0" smtClean="0">
-                <a:sym typeface="Wingdings"/>
-              </a:rPr>
-              <a:t>Rank</a:t>
-            </a:r>
-            <a:r>
-              <a:rPr lang="mr-IN" altLang="zh-CN" dirty="0" smtClean="0">
-                <a:sym typeface="Wingdings"/>
-              </a:rPr>
-              <a:t>…</a:t>
-            </a:r>
-            <a:r>
-              <a:rPr lang="en-US" altLang="zh-CN" dirty="0" smtClean="0">
-                <a:sym typeface="Wingdings"/>
-              </a:rPr>
-              <a:t>]</a:t>
-            </a:r>
-            <a:r>
-              <a:rPr lang="zh-CN" altLang="en-US" dirty="0" smtClean="0">
-                <a:sym typeface="Wingdings"/>
-              </a:rPr>
-              <a:t>，</a:t>
-            </a:r>
-            <a:r>
-              <a:rPr lang="zh-CN" altLang="en-US" baseline="0" dirty="0" smtClean="0">
-                <a:sym typeface="Wingdings"/>
-              </a:rPr>
-              <a:t>这样可以大致清楚都有什么</a:t>
-            </a:r>
-            <a:r>
-              <a:rPr lang="en-US" altLang="zh-CN" baseline="0" dirty="0" smtClean="0">
-                <a:sym typeface="Wingdings"/>
-              </a:rPr>
-              <a:t>fields</a:t>
-            </a:r>
-            <a:r>
-              <a:rPr lang="zh-CN" altLang="en-US" baseline="0" dirty="0" smtClean="0">
-                <a:sym typeface="Wingdings"/>
-              </a:rPr>
-              <a:t>，然后再</a:t>
-            </a:r>
-            <a:r>
-              <a:rPr lang="en-US" altLang="zh-CN" baseline="0" dirty="0" smtClean="0">
-                <a:sym typeface="Wingdings"/>
-              </a:rPr>
-              <a:t>label</a:t>
-            </a:r>
-            <a:r>
-              <a:rPr lang="zh-CN" altLang="en-US" baseline="0" dirty="0" smtClean="0">
-                <a:sym typeface="Wingdings"/>
-              </a:rPr>
-              <a:t> </a:t>
-            </a:r>
-            <a:r>
-              <a:rPr lang="en-US" altLang="zh-CN" baseline="0" dirty="0" err="1" smtClean="0">
-                <a:sym typeface="Wingdings"/>
-              </a:rPr>
-              <a:t>shown_up</a:t>
-            </a:r>
-            <a:r>
-              <a:rPr lang="zh-CN" altLang="en-US" baseline="0" dirty="0" smtClean="0">
-                <a:sym typeface="Wingdings"/>
-              </a:rPr>
-              <a:t> </a:t>
-            </a:r>
-            <a:r>
-              <a:rPr lang="en-US" altLang="zh-CN" baseline="0" dirty="0" smtClean="0">
-                <a:sym typeface="Wingdings"/>
-              </a:rPr>
-              <a:t>id</a:t>
-            </a:r>
-          </a:p>
-          <a:p>
-            <a:r>
-              <a:rPr lang="zh-CN" altLang="en-US" baseline="0" dirty="0" smtClean="0">
-                <a:sym typeface="Wingdings"/>
-              </a:rPr>
-              <a:t>对于每一个发现的</a:t>
-            </a:r>
-            <a:r>
-              <a:rPr lang="en-US" altLang="zh-CN" baseline="0" dirty="0" smtClean="0">
-                <a:sym typeface="Wingdings"/>
-              </a:rPr>
-              <a:t>value</a:t>
-            </a:r>
-            <a:r>
-              <a:rPr lang="zh-CN" altLang="en-US" baseline="0" dirty="0" smtClean="0">
-                <a:sym typeface="Wingdings"/>
-              </a:rPr>
-              <a:t>，都要确定其对应的</a:t>
-            </a:r>
-            <a:r>
-              <a:rPr lang="en-US" altLang="zh-CN" baseline="0" dirty="0" smtClean="0">
-                <a:sym typeface="Wingdings"/>
-              </a:rPr>
-              <a:t>field</a:t>
-            </a:r>
-            <a:endParaRPr lang="en-US" dirty="0"/>
+              <a:t>small fields with {possible paraphrases}</a:t>
+            </a:r>
+            <a:endParaRPr lang="en-US" dirty="0" smtClean="0"/>
           </a:p>
         </p:txBody>
       </p:sp>
@@ -1254,7 +1207,7 @@
           <a:p>
             <a:fld id="{F462D47B-A527-614C-BCC4-5E0D5E97ED78}" type="slidenum">
               <a:rPr lang="en-US" smtClean="0"/>
-              <a:t>10</a:t>
+              <a:t>9</a:t>
             </a:fld>
             <a:endParaRPr lang="en-US"/>
           </a:p>
@@ -1263,7 +1216,7 @@
     </p:spTree>
     <p:extLst>
       <p:ext uri="{BB962C8B-B14F-4D97-AF65-F5344CB8AC3E}">
-        <p14:creationId xmlns:p14="http://schemas.microsoft.com/office/powerpoint/2010/main" val="47796101"/>
+        <p14:creationId xmlns:p14="http://schemas.microsoft.com/office/powerpoint/2010/main" val="40941409"/>
       </p:ext>
     </p:extLst>
   </p:cSld>
@@ -1300,12 +1253,7 @@
             <p:ph type="sldImg"/>
           </p:nvPr>
         </p:nvSpPr>
-        <p:spPr>
-          <a:xfrm>
-            <a:off x="685800" y="1143000"/>
-            <a:ext cx="5486400" cy="3086100"/>
-          </a:xfrm>
-        </p:spPr>
+        <p:spPr/>
       </p:sp>
       <p:sp>
         <p:nvSpPr>
@@ -1323,12 +1271,144 @@
           <a:lstStyle/>
           <a:p>
             <a:r>
-              <a:rPr lang="en-US" dirty="0" smtClean="0"/>
-              <a:t>Attention-based </a:t>
-            </a:r>
-            <a:r>
-              <a:rPr lang="en-US" smtClean="0"/>
-              <a:t>seq2seq DNN, </a:t>
+              <a:rPr lang="zh-CN" altLang="en-US" dirty="0" smtClean="0"/>
+              <a:t>还是先</a:t>
+            </a:r>
+            <a:r>
+              <a:rPr lang="en-US" altLang="zh-CN" dirty="0" smtClean="0"/>
+              <a:t>tag</a:t>
+            </a:r>
+            <a:r>
+              <a:rPr lang="zh-CN" altLang="en-US" dirty="0" smtClean="0"/>
+              <a:t>成统一的</a:t>
+            </a:r>
+            <a:r>
+              <a:rPr lang="en-US" altLang="zh-CN" dirty="0" smtClean="0"/>
+              <a:t>field</a:t>
+            </a:r>
+            <a:r>
+              <a:rPr lang="zh-CN" altLang="en-US" dirty="0" smtClean="0"/>
+              <a:t> </a:t>
+            </a:r>
+            <a:r>
+              <a:rPr lang="en-US" altLang="zh-CN" dirty="0" smtClean="0"/>
+              <a:t>name</a:t>
+            </a:r>
+            <a:r>
+              <a:rPr lang="zh-CN" altLang="en-US" dirty="0" smtClean="0">
+                <a:sym typeface="Wingdings"/>
+              </a:rPr>
+              <a:t>：</a:t>
+            </a:r>
+            <a:r>
+              <a:rPr lang="en-US" altLang="zh-CN" dirty="0" smtClean="0">
+                <a:sym typeface="Wingdings"/>
+              </a:rPr>
+              <a:t>[Nation,</a:t>
+            </a:r>
+            <a:r>
+              <a:rPr lang="zh-CN" altLang="en-US" dirty="0" smtClean="0">
+                <a:sym typeface="Wingdings"/>
+              </a:rPr>
+              <a:t> </a:t>
+            </a:r>
+            <a:r>
+              <a:rPr lang="en-US" altLang="zh-CN" dirty="0" smtClean="0">
+                <a:sym typeface="Wingdings"/>
+              </a:rPr>
+              <a:t>Rank</a:t>
+            </a:r>
+            <a:r>
+              <a:rPr lang="mr-IN" altLang="zh-CN" dirty="0" smtClean="0">
+                <a:sym typeface="Wingdings"/>
+              </a:rPr>
+              <a:t>…</a:t>
+            </a:r>
+            <a:r>
+              <a:rPr lang="en-US" altLang="zh-CN" dirty="0" smtClean="0">
+                <a:sym typeface="Wingdings"/>
+              </a:rPr>
+              <a:t>]</a:t>
+            </a:r>
+            <a:r>
+              <a:rPr lang="zh-CN" altLang="en-US" dirty="0" smtClean="0">
+                <a:sym typeface="Wingdings"/>
+              </a:rPr>
+              <a:t>，</a:t>
+            </a:r>
+            <a:r>
+              <a:rPr lang="zh-CN" altLang="en-US" baseline="0" dirty="0" smtClean="0">
+                <a:sym typeface="Wingdings"/>
+              </a:rPr>
+              <a:t>这样可以大致清楚都有什么</a:t>
+            </a:r>
+            <a:r>
+              <a:rPr lang="en-US" altLang="zh-CN" baseline="0" dirty="0" smtClean="0">
+                <a:sym typeface="Wingdings"/>
+              </a:rPr>
+              <a:t>fields</a:t>
+            </a:r>
+            <a:r>
+              <a:rPr lang="zh-CN" altLang="en-US" baseline="0" dirty="0" smtClean="0">
+                <a:sym typeface="Wingdings"/>
+              </a:rPr>
+              <a:t>，然后再</a:t>
+            </a:r>
+            <a:r>
+              <a:rPr lang="en-US" altLang="zh-CN" baseline="0" dirty="0" smtClean="0">
+                <a:sym typeface="Wingdings"/>
+              </a:rPr>
+              <a:t>label</a:t>
+            </a:r>
+            <a:r>
+              <a:rPr lang="zh-CN" altLang="en-US" baseline="0" dirty="0" smtClean="0">
+                <a:sym typeface="Wingdings"/>
+              </a:rPr>
+              <a:t> </a:t>
+            </a:r>
+            <a:r>
+              <a:rPr lang="en-US" altLang="zh-CN" baseline="0" dirty="0" err="1" smtClean="0">
+                <a:sym typeface="Wingdings"/>
+              </a:rPr>
+              <a:t>shown_up</a:t>
+            </a:r>
+            <a:r>
+              <a:rPr lang="zh-CN" altLang="en-US" baseline="0" dirty="0" smtClean="0">
+                <a:sym typeface="Wingdings"/>
+              </a:rPr>
+              <a:t> </a:t>
+            </a:r>
+            <a:r>
+              <a:rPr lang="en-US" altLang="zh-CN" baseline="0" dirty="0" smtClean="0">
+                <a:sym typeface="Wingdings"/>
+              </a:rPr>
+              <a:t>id</a:t>
+            </a:r>
+          </a:p>
+          <a:p>
+            <a:r>
+              <a:rPr lang="zh-CN" altLang="en-US" baseline="0" dirty="0" smtClean="0">
+                <a:sym typeface="Wingdings"/>
+              </a:rPr>
+              <a:t>对于每一个发现的</a:t>
+            </a:r>
+            <a:r>
+              <a:rPr lang="en-US" altLang="zh-CN" baseline="0" dirty="0" smtClean="0">
+                <a:sym typeface="Wingdings"/>
+              </a:rPr>
+              <a:t>value</a:t>
+            </a:r>
+            <a:r>
+              <a:rPr lang="zh-CN" altLang="en-US" baseline="0" dirty="0" smtClean="0">
+                <a:sym typeface="Wingdings"/>
+              </a:rPr>
+              <a:t>，都要确定其对应的</a:t>
+            </a:r>
+            <a:r>
+              <a:rPr lang="en-US" altLang="zh-CN" baseline="0" dirty="0" smtClean="0">
+                <a:sym typeface="Wingdings"/>
+              </a:rPr>
+              <a:t>field</a:t>
             </a:r>
             <a:endParaRPr lang="en-US" dirty="0"/>
           </a:p>
@@ -1351,7 +1431,7 @@
           <a:p>
             <a:fld id="{F462D47B-A527-614C-BCC4-5E0D5E97ED78}" type="slidenum">
               <a:rPr lang="en-US" smtClean="0"/>
-              <a:t>12</a:t>
+              <a:t>10</a:t>
             </a:fld>
             <a:endParaRPr lang="en-US"/>
           </a:p>
@@ -1360,7 +1440,7 @@
     </p:spTree>
     <p:extLst>
       <p:ext uri="{BB962C8B-B14F-4D97-AF65-F5344CB8AC3E}">
-        <p14:creationId xmlns:p14="http://schemas.microsoft.com/office/powerpoint/2010/main" val="42821351"/>
+        <p14:creationId xmlns:p14="http://schemas.microsoft.com/office/powerpoint/2010/main" val="47796101"/>
       </p:ext>
     </p:extLst>
   </p:cSld>
@@ -1421,7 +1501,11 @@
           <a:p>
             <a:r>
               <a:rPr lang="en-US" dirty="0" smtClean="0"/>
-              <a:t>Attention-based seq2seq DNN</a:t>
+              <a:t>Attention-based </a:t>
+            </a:r>
+            <a:r>
+              <a:rPr lang="en-US" smtClean="0"/>
+              <a:t>seq2seq DNN, </a:t>
             </a:r>
             <a:endParaRPr lang="en-US" dirty="0"/>
           </a:p>
@@ -1444,7 +1528,7 @@
           <a:p>
             <a:fld id="{F462D47B-A527-614C-BCC4-5E0D5E97ED78}" type="slidenum">
               <a:rPr lang="en-US" smtClean="0"/>
-              <a:t>13</a:t>
+              <a:t>12</a:t>
             </a:fld>
             <a:endParaRPr lang="en-US"/>
           </a:p>
@@ -1453,7 +1537,7 @@
     </p:spTree>
     <p:extLst>
       <p:ext uri="{BB962C8B-B14F-4D97-AF65-F5344CB8AC3E}">
-        <p14:creationId xmlns:p14="http://schemas.microsoft.com/office/powerpoint/2010/main" val="484501821"/>
+        <p14:creationId xmlns:p14="http://schemas.microsoft.com/office/powerpoint/2010/main" val="42821351"/>
       </p:ext>
     </p:extLst>
   </p:cSld>
@@ -1537,7 +1621,7 @@
           <a:p>
             <a:fld id="{F462D47B-A527-614C-BCC4-5E0D5E97ED78}" type="slidenum">
               <a:rPr lang="en-US" smtClean="0"/>
-              <a:t>14</a:t>
+              <a:t>13</a:t>
             </a:fld>
             <a:endParaRPr lang="en-US"/>
           </a:p>
@@ -1546,7 +1630,7 @@
     </p:spTree>
     <p:extLst>
       <p:ext uri="{BB962C8B-B14F-4D97-AF65-F5344CB8AC3E}">
-        <p14:creationId xmlns:p14="http://schemas.microsoft.com/office/powerpoint/2010/main" val="1938708441"/>
+        <p14:creationId xmlns:p14="http://schemas.microsoft.com/office/powerpoint/2010/main" val="484501821"/>
       </p:ext>
     </p:extLst>
   </p:cSld>
@@ -1607,7 +1691,7 @@
           <a:p>
             <a:r>
               <a:rPr lang="en-US" dirty="0" smtClean="0"/>
-              <a:t>Logical forms</a:t>
+              <a:t>Attention-based seq2seq DNN</a:t>
             </a:r>
             <a:endParaRPr lang="en-US" dirty="0"/>
           </a:p>
@@ -1630,7 +1714,7 @@
           <a:p>
             <a:fld id="{F462D47B-A527-614C-BCC4-5E0D5E97ED78}" type="slidenum">
               <a:rPr lang="en-US" smtClean="0"/>
-              <a:t>15</a:t>
+              <a:t>14</a:t>
             </a:fld>
             <a:endParaRPr lang="en-US"/>
           </a:p>
@@ -1639,7 +1723,7 @@
     </p:spTree>
     <p:extLst>
       <p:ext uri="{BB962C8B-B14F-4D97-AF65-F5344CB8AC3E}">
-        <p14:creationId xmlns:p14="http://schemas.microsoft.com/office/powerpoint/2010/main" val="1230389964"/>
+        <p14:creationId xmlns:p14="http://schemas.microsoft.com/office/powerpoint/2010/main" val="1938708441"/>
       </p:ext>
     </p:extLst>
   </p:cSld>
@@ -1700,7 +1784,7 @@
           <a:p>
             <a:r>
               <a:rPr lang="en-US" dirty="0" smtClean="0"/>
-              <a:t>Attention-based seq2seq DNN</a:t>
+              <a:t>Logical forms</a:t>
             </a:r>
             <a:endParaRPr lang="en-US" dirty="0"/>
           </a:p>
@@ -1723,7 +1807,7 @@
           <a:p>
             <a:fld id="{F462D47B-A527-614C-BCC4-5E0D5E97ED78}" type="slidenum">
               <a:rPr lang="en-US" smtClean="0"/>
-              <a:t>16</a:t>
+              <a:t>15</a:t>
             </a:fld>
             <a:endParaRPr lang="en-US"/>
           </a:p>
@@ -1732,7 +1816,7 @@
     </p:spTree>
     <p:extLst>
       <p:ext uri="{BB962C8B-B14F-4D97-AF65-F5344CB8AC3E}">
-        <p14:creationId xmlns:p14="http://schemas.microsoft.com/office/powerpoint/2010/main" val="1695039058"/>
+        <p14:creationId xmlns:p14="http://schemas.microsoft.com/office/powerpoint/2010/main" val="1230389964"/>
       </p:ext>
     </p:extLst>
   </p:cSld>
@@ -1968,7 +2052,7 @@
           <a:p>
             <a:fld id="{9323D940-588B-B243-B64D-D9263B98B06E}" type="datetimeFigureOut">
               <a:rPr lang="en-US" smtClean="0"/>
-              <a:t>5/31/17</a:t>
+              <a:t>6/12/17</a:t>
             </a:fld>
             <a:endParaRPr lang="en-US"/>
           </a:p>
@@ -2171,7 +2255,7 @@
           <a:p>
             <a:fld id="{9323D940-588B-B243-B64D-D9263B98B06E}" type="datetimeFigureOut">
               <a:rPr lang="en-US" smtClean="0"/>
-              <a:t>5/31/17</a:t>
+              <a:t>6/12/17</a:t>
             </a:fld>
             <a:endParaRPr lang="en-US"/>
           </a:p>
@@ -2422,7 +2506,7 @@
           <a:p>
             <a:fld id="{9323D940-588B-B243-B64D-D9263B98B06E}" type="datetimeFigureOut">
               <a:rPr lang="en-US" smtClean="0"/>
-              <a:t>5/31/17</a:t>
+              <a:t>6/12/17</a:t>
             </a:fld>
             <a:endParaRPr lang="en-US"/>
           </a:p>
@@ -2587,7 +2671,7 @@
           <a:p>
             <a:fld id="{9323D940-588B-B243-B64D-D9263B98B06E}" type="datetimeFigureOut">
               <a:rPr lang="en-US" smtClean="0"/>
-              <a:t>5/31/17</a:t>
+              <a:t>6/12/17</a:t>
             </a:fld>
             <a:endParaRPr lang="en-US"/>
           </a:p>
@@ -2925,7 +3009,7 @@
           <a:p>
             <a:fld id="{9323D940-588B-B243-B64D-D9263B98B06E}" type="datetimeFigureOut">
               <a:rPr lang="en-US" smtClean="0"/>
-              <a:t>5/31/17</a:t>
+              <a:t>6/12/17</a:t>
             </a:fld>
             <a:endParaRPr lang="en-US"/>
           </a:p>
@@ -3195,7 +3279,7 @@
           <a:p>
             <a:fld id="{9323D940-588B-B243-B64D-D9263B98B06E}" type="datetimeFigureOut">
               <a:rPr lang="en-US" smtClean="0"/>
-              <a:t>5/31/17</a:t>
+              <a:t>6/12/17</a:t>
             </a:fld>
             <a:endParaRPr lang="en-US"/>
           </a:p>
@@ -3569,7 +3653,7 @@
           <a:p>
             <a:fld id="{9323D940-588B-B243-B64D-D9263B98B06E}" type="datetimeFigureOut">
               <a:rPr lang="en-US" smtClean="0"/>
-              <a:t>5/31/17</a:t>
+              <a:t>6/12/17</a:t>
             </a:fld>
             <a:endParaRPr lang="en-US"/>
           </a:p>
@@ -3682,7 +3766,7 @@
           <a:p>
             <a:fld id="{9323D940-588B-B243-B64D-D9263B98B06E}" type="datetimeFigureOut">
               <a:rPr lang="en-US" smtClean="0"/>
-              <a:t>5/31/17</a:t>
+              <a:t>6/12/17</a:t>
             </a:fld>
             <a:endParaRPr lang="en-US"/>
           </a:p>
@@ -3848,7 +3932,7 @@
           <a:p>
             <a:fld id="{9323D940-588B-B243-B64D-D9263B98B06E}" type="datetimeFigureOut">
               <a:rPr lang="en-US" smtClean="0"/>
-              <a:t>5/31/17</a:t>
+              <a:t>6/12/17</a:t>
             </a:fld>
             <a:endParaRPr lang="en-US"/>
           </a:p>
@@ -4197,7 +4281,7 @@
           <a:p>
             <a:fld id="{9323D940-588B-B243-B64D-D9263B98B06E}" type="datetimeFigureOut">
               <a:rPr lang="en-US" smtClean="0"/>
-              <a:t>5/31/17</a:t>
+              <a:t>6/12/17</a:t>
             </a:fld>
             <a:endParaRPr lang="en-US"/>
           </a:p>
@@ -4569,7 +4653,7 @@
           <a:p>
             <a:fld id="{9323D940-588B-B243-B64D-D9263B98B06E}" type="datetimeFigureOut">
               <a:rPr lang="en-US" smtClean="0"/>
-              <a:t>5/31/17</a:t>
+              <a:t>6/12/17</a:t>
             </a:fld>
             <a:endParaRPr lang="en-US"/>
           </a:p>
@@ -4851,7 +4935,7 @@
           <a:p>
             <a:fld id="{9323D940-588B-B243-B64D-D9263B98B06E}" type="datetimeFigureOut">
               <a:rPr lang="en-US" smtClean="0"/>
-              <a:t>5/31/17</a:t>
+              <a:t>6/12/17</a:t>
             </a:fld>
             <a:endParaRPr lang="en-US"/>
           </a:p>
@@ -6197,23 +6281,14 @@
           <a:lstStyle/>
           <a:p>
             <a:r>
-              <a:rPr lang="en-US" altLang="zh-CN" b="1" dirty="0" err="1" smtClean="0"/>
+              <a:rPr lang="en-US" altLang="zh-CN" b="1" dirty="0" smtClean="0"/>
               <a:t>QueryX</a:t>
             </a:r>
-            <a:endParaRPr lang="en-US" altLang="zh-CN" b="1" dirty="0" smtClean="0"/>
           </a:p>
           <a:p>
             <a:r>
               <a:rPr lang="en-US" altLang="zh-CN" b="1" dirty="0" smtClean="0"/>
-              <a:t>(.</a:t>
-            </a:r>
-            <a:r>
-              <a:rPr lang="en-US" altLang="zh-CN" b="1" dirty="0" err="1" smtClean="0"/>
-              <a:t>qux</a:t>
-            </a:r>
-            <a:r>
-              <a:rPr lang="en-US" altLang="zh-CN" b="1" dirty="0" smtClean="0"/>
-              <a:t>)</a:t>
+              <a:t>(.qux)</a:t>
             </a:r>
           </a:p>
         </p:txBody>
@@ -7458,15 +7533,7 @@
             </a:r>
             <a:r>
               <a:rPr lang="en-US" sz="2000" dirty="0" smtClean="0"/>
-              <a:t>: .</a:t>
-            </a:r>
-            <a:r>
-              <a:rPr lang="en-US" sz="2000" dirty="0" err="1" smtClean="0"/>
-              <a:t>qu</a:t>
-            </a:r>
-            <a:r>
-              <a:rPr lang="en-US" sz="2000" dirty="0" smtClean="0"/>
-              <a:t>, .fi, </a:t>
+              <a:t>: .qu, .fi, </a:t>
             </a:r>
             <a:r>
               <a:rPr lang="en-US" sz="2000" b="1" dirty="0" smtClean="0"/>
@@ -7482,15 +7549,7 @@
             </a:r>
             <a:r>
               <a:rPr lang="en-US" sz="2000" dirty="0" smtClean="0"/>
-              <a:t>files); .ta, .</a:t>
-            </a:r>
-            <a:r>
-              <a:rPr lang="en-US" sz="2000" dirty="0" err="1" smtClean="0"/>
-              <a:t>qux</a:t>
-            </a:r>
-            <a:r>
-              <a:rPr lang="en-US" sz="2000" dirty="0" smtClean="0"/>
-              <a:t>, </a:t>
+              <a:t>files); .ta, .qux, </a:t>
             </a:r>
             <a:r>
               <a:rPr lang="en-US" sz="2000" b="1" dirty="0" smtClean="0"/>
@@ -7541,7 +7600,34 @@
                 </a:solidFill>
                 <a:latin typeface="Helvetica Neue" charset="0"/>
               </a:rPr>
-              <a:t>Silver </a:t>
+              <a:t>Silver where </a:t>
+            </a:r>
+            <a:r>
+              <a:rPr lang="en-US" dirty="0">
+                <a:solidFill>
+                  <a:srgbClr val="454545"/>
+                </a:solidFill>
+                <a:latin typeface="Helvetica Neue" charset="0"/>
+              </a:rPr>
+              <a:t>Nation equal </a:t>
+            </a:r>
+            <a:r>
+              <a:rPr lang="en-US" dirty="0" err="1">
+                <a:solidFill>
+                  <a:srgbClr val="454545"/>
+                </a:solidFill>
+                <a:latin typeface="Helvetica Neue" charset="0"/>
+              </a:rPr>
+              <a:t>italy</a:t>
+            </a:r>
+            <a:r>
+              <a:rPr lang="en-US" dirty="0">
+                <a:solidFill>
+                  <a:srgbClr val="454545"/>
+                </a:solidFill>
+                <a:latin typeface="Helvetica Neue" charset="0"/>
+              </a:rPr>
+              <a:t> </a:t>
             </a:r>
             <a:r>
               <a:rPr lang="en-US" dirty="0" smtClean="0">
@@ -7550,52 +7636,7 @@
                 </a:solidFill>
                 <a:latin typeface="Helvetica Neue" charset="0"/>
               </a:rPr>
-              <a:t>where </a:t>
-            </a:r>
-            <a:r>
-              <a:rPr lang="en-US" dirty="0">
-                <a:solidFill>
-                  <a:srgbClr val="454545"/>
-                </a:solidFill>
-                <a:latin typeface="Helvetica Neue" charset="0"/>
-              </a:rPr>
-              <a:t>Nation equal </a:t>
-            </a:r>
-            <a:r>
-              <a:rPr lang="en-US" dirty="0" err="1">
-                <a:solidFill>
-                  <a:srgbClr val="454545"/>
-                </a:solidFill>
-                <a:latin typeface="Helvetica Neue" charset="0"/>
-              </a:rPr>
-              <a:t>italy</a:t>
-            </a:r>
-            <a:r>
-              <a:rPr lang="en-US" dirty="0">
-                <a:solidFill>
-                  <a:srgbClr val="454545"/>
-                </a:solidFill>
-                <a:latin typeface="Helvetica Neue" charset="0"/>
-              </a:rPr>
-              <a:t> </a:t>
-            </a:r>
-            <a:r>
-              <a:rPr lang="en-US" dirty="0" smtClean="0">
-                <a:solidFill>
-                  <a:srgbClr val="454545"/>
-                </a:solidFill>
-                <a:latin typeface="Helvetica Neue" charset="0"/>
-              </a:rPr>
-              <a:t>and </a:t>
-            </a:r>
-            <a:r>
-              <a:rPr lang="en-US" dirty="0" smtClean="0">
-                <a:solidFill>
-                  <a:srgbClr val="454545"/>
-                </a:solidFill>
-                <a:latin typeface="Helvetica Neue" charset="0"/>
-              </a:rPr>
-              <a:t>where </a:t>
+              <a:t>and where </a:t>
             </a:r>
             <a:r>
               <a:rPr lang="en-US" dirty="0">
@@ -7869,11 +7910,7 @@
           <a:p>
             <a:r>
               <a:rPr lang="en-US" b="1" dirty="0" smtClean="0"/>
-              <a:t>.</a:t>
-            </a:r>
-            <a:r>
-              <a:rPr lang="en-US" b="1" dirty="0" err="1" smtClean="0"/>
-              <a:t>ficorr</a:t>
+              <a:t>.ficorr</a:t>
             </a:r>
             <a:endParaRPr lang="en-US" b="1" dirty="0"/>
           </a:p>
@@ -7903,11 +7940,7 @@
           <a:p>
             <a:r>
               <a:rPr lang="en-US" b="1" dirty="0" smtClean="0"/>
-              <a:t>.</a:t>
-            </a:r>
-            <a:r>
-              <a:rPr lang="en-US" b="1" dirty="0" err="1" smtClean="0"/>
-              <a:t>vacorr</a:t>
+              <a:t>.vacorr</a:t>
             </a:r>
             <a:endParaRPr lang="en-US" b="1" dirty="0"/>
           </a:p>
@@ -8059,19 +8092,11 @@
             </a:r>
             <a:r>
               <a:rPr lang="en-US" dirty="0" err="1" smtClean="0"/>
-              <a:t>qu</a:t>
+              <a:t>qu+.ta</a:t>
             </a:r>
             <a:r>
               <a:rPr lang="en-US" dirty="0" smtClean="0"/>
-              <a:t>+.ta / .</a:t>
-            </a:r>
-            <a:r>
-              <a:rPr lang="en-US" dirty="0" err="1" smtClean="0"/>
-              <a:t>qux</a:t>
-            </a:r>
-            <a:r>
-              <a:rPr lang="en-US" dirty="0" smtClean="0"/>
-              <a:t>)</a:t>
+              <a:t> / .qux)</a:t>
             </a:r>
             <a:endParaRPr lang="en-US" dirty="0"/>
           </a:p>
@@ -9008,19 +9033,10 @@
                 </a:solidFill>
                 <a:latin typeface="Helvetica Neue" charset="0"/>
               </a:rPr>
-              <a:t> </a:t>
-            </a:r>
-            <a:r>
-              <a:rPr lang="en-US">
-                <a:solidFill>
-                  <a:srgbClr val="454545"/>
-                </a:solidFill>
-                <a:latin typeface="Helvetica Neue" charset="0"/>
-              </a:rPr>
-              <a:t>and </a:t>
-            </a:r>
-            <a:r>
-              <a:rPr lang="en-US" smtClean="0">
+              <a:t> and </a:t>
+            </a:r>
+            <a:r>
+              <a:rPr lang="en-US" dirty="0" smtClean="0">
                 <a:solidFill>
                   <a:srgbClr val="454545"/>
                 </a:solidFill>
@@ -9079,11 +9095,7 @@
           <a:p>
             <a:r>
               <a:rPr lang="en-US" b="1" dirty="0" smtClean="0"/>
-              <a:t>.</a:t>
-            </a:r>
-            <a:r>
-              <a:rPr lang="en-US" b="1" dirty="0" err="1" smtClean="0"/>
-              <a:t>ficorr</a:t>
+              <a:t>.ficorr</a:t>
             </a:r>
             <a:endParaRPr lang="en-US" b="1" dirty="0"/>
           </a:p>
@@ -9113,11 +9125,7 @@
           <a:p>
             <a:r>
               <a:rPr lang="en-US" b="1" dirty="0" smtClean="0"/>
-              <a:t>.</a:t>
-            </a:r>
-            <a:r>
-              <a:rPr lang="en-US" b="1" dirty="0" err="1" smtClean="0"/>
-              <a:t>vacorr</a:t>
+              <a:t>.vacorr</a:t>
             </a:r>
             <a:endParaRPr lang="en-US" b="1" dirty="0"/>
           </a:p>
@@ -9302,19 +9310,11 @@
             </a:r>
             <a:r>
               <a:rPr lang="en-US" dirty="0" err="1" smtClean="0"/>
-              <a:t>qu</a:t>
+              <a:t>qu+.ta</a:t>
             </a:r>
             <a:r>
               <a:rPr lang="en-US" dirty="0" smtClean="0"/>
-              <a:t>+.ta / .</a:t>
-            </a:r>
-            <a:r>
-              <a:rPr lang="en-US" dirty="0" err="1" smtClean="0"/>
-              <a:t>qux</a:t>
-            </a:r>
-            <a:r>
-              <a:rPr lang="en-US" dirty="0" smtClean="0"/>
-              <a:t>)</a:t>
+              <a:t> / .qux)</a:t>
             </a:r>
             <a:endParaRPr lang="en-US" dirty="0"/>
           </a:p>
@@ -10307,15 +10307,7 @@
             </a:r>
             <a:r>
               <a:rPr lang="en-US" dirty="0"/>
-              <a:t>. </a:t>
-            </a:r>
-            <a:r>
-              <a:rPr lang="en-US" dirty="0" err="1"/>
-              <a:t>argmax</a:t>
-            </a:r>
-            <a:r>
-              <a:rPr lang="en-US" dirty="0"/>
-              <a:t> Nation </a:t>
+              <a:t>. argmax Nation </a:t>
             </a:r>
             <a:r>
               <a:rPr lang="en-US" b="1" dirty="0"/>
@@ -10323,15 +10315,7 @@
             </a:r>
             <a:r>
               <a:rPr lang="en-US" dirty="0"/>
-              <a:t> -&gt; </a:t>
-            </a:r>
-            <a:r>
-              <a:rPr lang="en-US" dirty="0" err="1"/>
-              <a:t>argmax</a:t>
-            </a:r>
-            <a:r>
-              <a:rPr lang="en-US" dirty="0"/>
-              <a:t> Nation </a:t>
+              <a:t> -&gt; argmax Nation </a:t>
             </a:r>
             <a:r>
               <a:rPr lang="en-US" b="1" dirty="0" smtClean="0"/>
@@ -10447,15 +10431,7 @@
             </a:r>
             <a:r>
               <a:rPr lang="en-US" dirty="0" smtClean="0"/>
-              <a:t>. </a:t>
-            </a:r>
-            <a:r>
-              <a:rPr lang="en-US" dirty="0" smtClean="0"/>
-              <a:t>has/had, is/are, is/was, ‘the’</a:t>
-            </a:r>
-            <a:r>
-              <a:rPr lang="en-US" dirty="0" smtClean="0"/>
-              <a:t>)</a:t>
+              <a:t>. has/had, is/are, is/was, ‘the’)</a:t>
             </a:r>
             <a:endParaRPr lang="en-US" dirty="0"/>
           </a:p>
@@ -10803,11 +10779,7 @@
           <a:p>
             <a:r>
               <a:rPr lang="en-US" sz="2400" dirty="0" smtClean="0"/>
-              <a:t>Natural Language Interface </a:t>
-            </a:r>
-            <a:r>
-              <a:rPr lang="en-US" sz="2400" dirty="0" smtClean="0"/>
-              <a:t>(NLI):</a:t>
+              <a:t>Natural Language Interface (NLI):</a:t>
             </a:r>
             <a:endParaRPr lang="en-US" sz="2400" dirty="0"/>
           </a:p>
@@ -10888,19 +10860,11 @@
             </a:r>
             <a:r>
               <a:rPr lang="en-US" dirty="0" err="1" smtClean="0"/>
-              <a:t>qu</a:t>
+              <a:t>qu+.ta</a:t>
             </a:r>
             <a:r>
               <a:rPr lang="en-US" dirty="0" smtClean="0"/>
-              <a:t>+.ta / .</a:t>
-            </a:r>
-            <a:r>
-              <a:rPr lang="en-US" dirty="0" err="1" smtClean="0"/>
-              <a:t>qux</a:t>
-            </a:r>
-            <a:r>
-              <a:rPr lang="en-US" dirty="0" smtClean="0"/>
-              <a:t>)</a:t>
+              <a:t> / .qux)</a:t>
             </a:r>
             <a:endParaRPr lang="en-US" dirty="0"/>
           </a:p>
@@ -11092,16 +11056,7 @@
                 </a:solidFill>
                 <a:latin typeface="Helvetica Neue" charset="0"/>
               </a:rPr>
-              <a:t>35</a:t>
-            </a:r>
-            <a:r>
-              <a:rPr lang="en-US" dirty="0" smtClean="0">
-                <a:solidFill>
-                  <a:srgbClr val="454545"/>
-                </a:solidFill>
-                <a:latin typeface="Helvetica Neue" charset="0"/>
-              </a:rPr>
-              <a:t>00 </a:t>
+              <a:t>3500 </a:t>
             </a:r>
             <a:r>
               <a:rPr lang="en-US" dirty="0">
@@ -11277,23 +11232,8 @@
                 </a:solidFill>
                 <a:latin typeface="Helvetica Neue" charset="0"/>
               </a:rPr>
-              <a:t>test accuracy (p): </a:t>
-            </a:r>
-            <a:r>
-              <a:rPr lang="en-US" dirty="0">
-                <a:solidFill>
-                  <a:srgbClr val="454545"/>
-                </a:solidFill>
-                <a:latin typeface="Helvetica Neue" charset="0"/>
-              </a:rPr>
-              <a:t>0.8167855183763757</a:t>
-            </a:r>
-            <a:endParaRPr lang="en-US" dirty="0">
-              <a:solidFill>
-                <a:srgbClr val="454545"/>
-              </a:solidFill>
-              <a:latin typeface="Helvetica Neue" charset="0"/>
-            </a:endParaRPr>
+              <a:t>test accuracy (p): 0.8167855183763757</a:t>
+            </a:r>
           </a:p>
         </p:txBody>
       </p:sp>
@@ -11771,15 +11711,7 @@
           <a:p>
             <a:r>
               <a:rPr lang="en-US" sz="2400" dirty="0" smtClean="0"/>
-              <a:t>Pre-trained Natural </a:t>
-            </a:r>
-            <a:r>
-              <a:rPr lang="en-US" sz="2400" dirty="0" smtClean="0"/>
-              <a:t>Language Interface (NLI</a:t>
-            </a:r>
-            <a:r>
-              <a:rPr lang="en-US" sz="2400" dirty="0" smtClean="0"/>
-              <a:t>)</a:t>
+              <a:t>Pre-trained Natural Language Interface (NLI)</a:t>
             </a:r>
           </a:p>
           <a:p>
@@ -12299,11 +12231,7 @@
           <a:p>
             <a:r>
               <a:rPr lang="en-US" smtClean="0"/>
-              <a:t>Unique </a:t>
-            </a:r>
-            <a:r>
-              <a:rPr lang="en-US" smtClean="0"/>
-              <a:t>Queries</a:t>
+              <a:t>Unique Queries</a:t>
             </a:r>
             <a:endParaRPr lang="en-US" dirty="0"/>
           </a:p>
@@ -13677,8 +13605,8 @@
           </a:p>
         </p:txBody>
       </p:sp>
-      <mc:AlternateContent xmlns:mc="http://schemas.openxmlformats.org/markup-compatibility/2006">
-        <mc:Choice xmlns:a14="http://schemas.microsoft.com/office/drawing/2010/main" Requires="a14">
+      <mc:AlternateContent xmlns:mc="http://schemas.openxmlformats.org/markup-compatibility/2006" xmlns:a14="http://schemas.microsoft.com/office/drawing/2010/main">
+        <mc:Choice Requires="a14">
           <p:sp>
             <p:nvSpPr>
               <p:cNvPr id="3" name="Content Placeholder 2"/>
@@ -13711,11 +13639,7 @@
                 </a:r>
                 <a:r>
                   <a:rPr lang="en-US" sz="2400" i="1" dirty="0" smtClean="0"/>
-                  <a:t>interface to database (NLIDB</a:t>
-                </a:r>
-                <a:r>
-                  <a:rPr lang="en-US" sz="2400" i="1" dirty="0" smtClean="0"/>
-                  <a:t>), </a:t>
+                  <a:t>interface to database (NLIDB), </a:t>
                 </a:r>
                 <a:r>
                   <a:rPr lang="en-US" sz="2400" i="1" u="sng" dirty="0" smtClean="0"/>
@@ -13955,7 +13879,7 @@
             </p:txBody>
           </p:sp>
         </mc:Choice>
-        <mc:Fallback>
+        <mc:Fallback xmlns="">
           <p:sp>
             <p:nvSpPr>
               <p:cNvPr id="3" name="Content Placeholder 2"/>
@@ -15124,7 +15048,7 @@
         </p:nvSpPr>
         <p:spPr>
           <a:xfrm>
-            <a:off x="2489616" y="1409073"/>
+            <a:off x="2646784" y="1137601"/>
             <a:ext cx="1760721" cy="3372787"/>
           </a:xfrm>
           <a:prstGeom prst="rect">
@@ -15165,7 +15089,7 @@
         </p:nvSpPr>
         <p:spPr>
           <a:xfrm>
-            <a:off x="5325261" y="1409073"/>
+            <a:off x="5482429" y="1137601"/>
             <a:ext cx="3413669" cy="3372787"/>
           </a:xfrm>
           <a:prstGeom prst="rect">
@@ -15209,7 +15133,7 @@
         </p:nvSpPr>
         <p:spPr>
           <a:xfrm>
-            <a:off x="9752927" y="1409074"/>
+            <a:off x="9910095" y="1137602"/>
             <a:ext cx="1817586" cy="3372787"/>
           </a:xfrm>
           <a:prstGeom prst="rect">
@@ -15250,7 +15174,7 @@
         </p:nvSpPr>
         <p:spPr>
           <a:xfrm>
-            <a:off x="2440286" y="781323"/>
+            <a:off x="2597454" y="509851"/>
             <a:ext cx="2098623" cy="646331"/>
           </a:xfrm>
           <a:prstGeom prst="rect">
@@ -15280,7 +15204,7 @@
         </p:nvSpPr>
         <p:spPr>
           <a:xfrm>
-            <a:off x="5264448" y="772033"/>
+            <a:off x="5421616" y="500561"/>
             <a:ext cx="2098623" cy="646331"/>
           </a:xfrm>
           <a:prstGeom prst="rect">
@@ -15310,7 +15234,7 @@
         </p:nvSpPr>
         <p:spPr>
           <a:xfrm>
-            <a:off x="9598697" y="1409073"/>
+            <a:off x="9755865" y="1137601"/>
             <a:ext cx="2098623" cy="646331"/>
           </a:xfrm>
           <a:prstGeom prst="rect">
@@ -15341,7 +15265,7 @@
         </p:nvSpPr>
         <p:spPr>
           <a:xfrm>
-            <a:off x="5537226" y="1725114"/>
+            <a:off x="5694394" y="1453642"/>
             <a:ext cx="1210827" cy="2740704"/>
           </a:xfrm>
           <a:prstGeom prst="rect">
@@ -15382,7 +15306,7 @@
         </p:nvSpPr>
         <p:spPr>
           <a:xfrm>
-            <a:off x="2781090" y="1732238"/>
+            <a:off x="2938258" y="1460766"/>
             <a:ext cx="1273837" cy="2740704"/>
           </a:xfrm>
           <a:prstGeom prst="rect">
@@ -15423,7 +15347,7 @@
         </p:nvSpPr>
         <p:spPr>
           <a:xfrm>
-            <a:off x="2871029" y="1765808"/>
+            <a:off x="3028197" y="1494336"/>
             <a:ext cx="905656" cy="369332"/>
           </a:xfrm>
           <a:prstGeom prst="rect">
@@ -15453,7 +15377,7 @@
         </p:nvSpPr>
         <p:spPr>
           <a:xfrm>
-            <a:off x="5556970" y="1735828"/>
+            <a:off x="5714138" y="1464356"/>
             <a:ext cx="1032456" cy="923330"/>
           </a:xfrm>
           <a:prstGeom prst="rect">
@@ -15506,7 +15430,7 @@
         </p:nvCxnSpPr>
         <p:spPr>
           <a:xfrm>
-            <a:off x="5283479" y="3085036"/>
+            <a:off x="5440647" y="2813564"/>
             <a:ext cx="253747" cy="10430"/>
           </a:xfrm>
           <a:prstGeom prst="straightConnector1">
@@ -15539,7 +15463,7 @@
         </p:nvSpPr>
         <p:spPr>
           <a:xfrm>
-            <a:off x="4311264" y="2931147"/>
+            <a:off x="4468432" y="2659675"/>
             <a:ext cx="972215" cy="307777"/>
           </a:xfrm>
           <a:prstGeom prst="rect">
@@ -15560,7 +15484,7 @@
           <a:p>
             <a:pPr algn="ctr"/>
             <a:r>
-              <a:rPr lang="en-US" sz="1400" dirty="0" err="1" smtClean="0"/>
+              <a:rPr lang="en-US" sz="1400" dirty="0" smtClean="0"/>
               <a:t>Tag_query</a:t>
             </a:r>
             <a:endParaRPr lang="en-US" sz="1400" dirty="0"/>
@@ -15578,8 +15502,8 @@
         </p:nvCxnSpPr>
         <p:spPr>
           <a:xfrm>
-            <a:off x="6748053" y="3095466"/>
-            <a:ext cx="254741" cy="3562"/>
+            <a:off x="6905221" y="2823994"/>
+            <a:ext cx="154230" cy="3562"/>
           </a:xfrm>
           <a:prstGeom prst="straightConnector1">
             <a:avLst/>
@@ -15613,9 +15537,9 @@
           <p:nvPr/>
         </p:nvCxnSpPr>
         <p:spPr>
-          <a:xfrm>
-            <a:off x="8629432" y="3099028"/>
-            <a:ext cx="1403343" cy="3789"/>
+          <a:xfrm flipV="1">
+            <a:off x="8786600" y="2823640"/>
+            <a:ext cx="1403343" cy="3916"/>
           </a:xfrm>
           <a:prstGeom prst="straightConnector1">
             <a:avLst/>
@@ -15647,8 +15571,8 @@
         </p:nvSpPr>
         <p:spPr>
           <a:xfrm>
-            <a:off x="10032775" y="2841207"/>
-            <a:ext cx="1228725" cy="523220"/>
+            <a:off x="10189943" y="2669751"/>
+            <a:ext cx="1228725" cy="307777"/>
           </a:xfrm>
           <a:prstGeom prst="rect">
             <a:avLst/>
@@ -15669,18 +15593,10 @@
             <a:pPr algn="ctr"/>
             <a:r>
               <a:rPr lang="en-US" sz="1400" smtClean="0"/>
-              <a:t>SQL-</a:t>
-            </a:r>
-            <a:r>
-              <a:rPr lang="en-US" altLang="zh-CN" sz="1400" smtClean="0"/>
-              <a:t>extended</a:t>
-            </a:r>
-            <a:r>
-              <a:rPr lang="en-US" sz="1400" smtClean="0"/>
-              <a:t> </a:t>
-            </a:r>
-            <a:r>
-              <a:rPr lang="en-US" sz="1400" smtClean="0"/>
+              <a:t>SQL </a:t>
+            </a:r>
+            <a:r>
+              <a:rPr lang="en-US" sz="1400" dirty="0" smtClean="0"/>
               <a:t>command</a:t>
             </a:r>
             <a:endParaRPr lang="en-US" sz="1400" dirty="0"/>
@@ -15695,7 +15611,7 @@
         </p:nvSpPr>
         <p:spPr>
           <a:xfrm>
-            <a:off x="6874860" y="2392131"/>
+            <a:off x="7032028" y="2120659"/>
             <a:ext cx="1937485" cy="523220"/>
           </a:xfrm>
           <a:prstGeom prst="rect">
@@ -15711,15 +15627,7 @@
           <a:p>
             <a:r>
               <a:rPr lang="en-US" sz="1400" dirty="0" smtClean="0"/>
-              <a:t>where &lt;f:1&gt; equal &lt;v:1&gt; select &lt;</a:t>
-            </a:r>
-            <a:r>
-              <a:rPr lang="en-US" sz="1400" dirty="0" smtClean="0"/>
-              <a:t>f:2</a:t>
-            </a:r>
-            <a:r>
-              <a:rPr lang="en-US" sz="1400" dirty="0" smtClean="0"/>
-              <a:t>&gt;</a:t>
+              <a:t>where &lt;f:1&gt; equal &lt;v:1&gt; select &lt;f:2&gt;</a:t>
             </a:r>
             <a:endParaRPr lang="en-US" sz="1400" dirty="0"/>
           </a:p>
@@ -15733,7 +15641,7 @@
         </p:nvCxnSpPr>
         <p:spPr>
           <a:xfrm>
-            <a:off x="1919055" y="3907431"/>
+            <a:off x="2076223" y="3635959"/>
             <a:ext cx="862035" cy="0"/>
           </a:xfrm>
           <a:prstGeom prst="straightConnector1">
@@ -15766,7 +15674,7 @@
         </p:nvCxnSpPr>
         <p:spPr>
           <a:xfrm flipV="1">
-            <a:off x="1937793" y="2545827"/>
+            <a:off x="2094961" y="2274355"/>
             <a:ext cx="990253" cy="1"/>
           </a:xfrm>
           <a:prstGeom prst="straightConnector1">
@@ -15799,7 +15707,7 @@
         </p:nvSpPr>
         <p:spPr>
           <a:xfrm>
-            <a:off x="449705" y="3837481"/>
+            <a:off x="606873" y="3566009"/>
             <a:ext cx="1469350" cy="134912"/>
           </a:xfrm>
           <a:prstGeom prst="rect">
@@ -15839,7 +15747,7 @@
         </p:nvSpPr>
         <p:spPr>
           <a:xfrm>
-            <a:off x="452205" y="2490868"/>
+            <a:off x="609373" y="2219396"/>
             <a:ext cx="1469350" cy="134912"/>
           </a:xfrm>
           <a:prstGeom prst="rect">
@@ -15885,7 +15793,7 @@
         </p:nvSpPr>
         <p:spPr>
           <a:xfrm>
-            <a:off x="277951" y="2055404"/>
+            <a:off x="435119" y="1783932"/>
             <a:ext cx="1029006" cy="369332"/>
           </a:xfrm>
           <a:prstGeom prst="rect">
@@ -15915,7 +15823,7 @@
         </p:nvSpPr>
         <p:spPr>
           <a:xfrm>
-            <a:off x="298241" y="3451771"/>
+            <a:off x="455409" y="3180299"/>
             <a:ext cx="1029006" cy="369332"/>
           </a:xfrm>
           <a:prstGeom prst="rect">
@@ -15945,7 +15853,7 @@
         </p:nvCxnSpPr>
         <p:spPr>
           <a:xfrm flipH="1">
-            <a:off x="524655" y="2558324"/>
+            <a:off x="681823" y="2286852"/>
             <a:ext cx="2500" cy="322571"/>
           </a:xfrm>
           <a:prstGeom prst="line">
@@ -15975,7 +15883,7 @@
         </p:nvCxnSpPr>
         <p:spPr>
           <a:xfrm>
-            <a:off x="679555" y="2575814"/>
+            <a:off x="836723" y="2304342"/>
             <a:ext cx="0" cy="673238"/>
           </a:xfrm>
           <a:prstGeom prst="line">
@@ -16005,7 +15913,7 @@
         </p:nvCxnSpPr>
         <p:spPr>
           <a:xfrm>
-            <a:off x="831955" y="2593304"/>
+            <a:off x="989123" y="2321832"/>
             <a:ext cx="0" cy="496795"/>
           </a:xfrm>
           <a:prstGeom prst="line">
@@ -16035,7 +15943,7 @@
         </p:nvCxnSpPr>
         <p:spPr>
           <a:xfrm flipH="1">
-            <a:off x="1011835" y="2565824"/>
+            <a:off x="1169003" y="2294352"/>
             <a:ext cx="2500" cy="322571"/>
           </a:xfrm>
           <a:prstGeom prst="line">
@@ -16065,7 +15973,7 @@
         </p:nvCxnSpPr>
         <p:spPr>
           <a:xfrm>
-            <a:off x="1166735" y="2583314"/>
+            <a:off x="1323903" y="2311842"/>
             <a:ext cx="0" cy="487031"/>
           </a:xfrm>
           <a:prstGeom prst="line">
@@ -16095,7 +16003,7 @@
         </p:nvCxnSpPr>
         <p:spPr>
           <a:xfrm>
-            <a:off x="1334125" y="2570824"/>
+            <a:off x="1491293" y="2299352"/>
             <a:ext cx="0" cy="360323"/>
           </a:xfrm>
           <a:prstGeom prst="line">
@@ -16125,8 +16033,8 @@
         </p:nvSpPr>
         <p:spPr>
           <a:xfrm>
-            <a:off x="955005" y="3062240"/>
-            <a:ext cx="1219198" cy="307777"/>
+            <a:off x="1112173" y="2790768"/>
+            <a:ext cx="1301190" cy="307777"/>
           </a:xfrm>
           <a:prstGeom prst="rect">
             <a:avLst/>
@@ -16140,8 +16048,8 @@
           <a:lstStyle/>
           <a:p>
             <a:r>
-              <a:rPr lang="en-US" sz="1400" dirty="0" smtClean="0"/>
-              <a:t>fields values</a:t>
+              <a:rPr lang="en-US" sz="1400" smtClean="0"/>
+              <a:t>fields &amp; values</a:t>
             </a:r>
             <a:endParaRPr lang="en-US" sz="1400" dirty="0"/>
           </a:p>
@@ -16158,7 +16066,7 @@
         </p:nvCxnSpPr>
         <p:spPr>
           <a:xfrm rot="16200000" flipH="1" flipV="1">
-            <a:off x="5403922" y="-3202394"/>
+            <a:off x="5561090" y="-3473866"/>
             <a:ext cx="646330" cy="9869266"/>
           </a:xfrm>
           <a:prstGeom prst="bentConnector3">
@@ -16193,7 +16101,7 @@
         </p:nvSpPr>
         <p:spPr>
           <a:xfrm>
-            <a:off x="2930974" y="2270309"/>
+            <a:off x="3088142" y="1998837"/>
             <a:ext cx="1062435" cy="523220"/>
           </a:xfrm>
           <a:prstGeom prst="rect">
@@ -16220,47 +16128,7 @@
                   </a:schemeClr>
                 </a:solidFill>
               </a:rPr>
-              <a:t>Correspond</a:t>
-            </a:r>
-            <a:r>
-              <a:rPr lang="en-US" altLang="zh-CN" sz="1400" b="1" dirty="0" smtClean="0">
-                <a:solidFill>
-                  <a:schemeClr val="accent5">
-                    <a:lumMod val="75000"/>
-                  </a:schemeClr>
-                </a:solidFill>
-              </a:rPr>
-              <a:t>-</a:t>
-            </a:r>
-            <a:r>
-              <a:rPr lang="en-US" sz="1400" b="1" dirty="0" err="1" smtClean="0">
-                <a:solidFill>
-                  <a:schemeClr val="accent5">
-                    <a:lumMod val="75000"/>
-                  </a:schemeClr>
-                </a:solidFill>
-              </a:rPr>
-              <a:t>ence</a:t>
-            </a:r>
-            <a:r>
-              <a:rPr lang="en-US" sz="1400" b="1" dirty="0" smtClean="0">
-                <a:solidFill>
-                  <a:schemeClr val="accent5">
-                    <a:lumMod val="75000"/>
-                  </a:schemeClr>
-                </a:solidFill>
-              </a:rPr>
-              <a:t> </a:t>
-            </a:r>
-            <a:r>
-              <a:rPr lang="en-US" sz="1400" b="1" dirty="0" smtClean="0">
-                <a:solidFill>
-                  <a:schemeClr val="accent5">
-                    <a:lumMod val="75000"/>
-                  </a:schemeClr>
-                </a:solidFill>
-              </a:rPr>
-              <a:t>files</a:t>
+              <a:t>Correspondence files</a:t>
             </a:r>
             <a:endParaRPr lang="en-US" sz="1400" b="1" dirty="0">
               <a:solidFill>
@@ -16283,8 +16151,8 @@
         </p:nvCxnSpPr>
         <p:spPr>
           <a:xfrm flipV="1">
-            <a:off x="10647138" y="2055404"/>
-            <a:ext cx="871" cy="785803"/>
+            <a:off x="10804306" y="1783932"/>
+            <a:ext cx="871" cy="885819"/>
           </a:xfrm>
           <a:prstGeom prst="straightConnector1">
             <a:avLst/>
@@ -16316,7 +16184,7 @@
         </p:nvSpPr>
         <p:spPr>
           <a:xfrm>
-            <a:off x="8694806" y="3109849"/>
+            <a:off x="8851974" y="2838377"/>
             <a:ext cx="1293192" cy="523220"/>
           </a:xfrm>
           <a:prstGeom prst="rect">
@@ -16338,27 +16206,7 @@
                   </a:schemeClr>
                 </a:solidFill>
               </a:rPr>
-              <a:t>look up .</a:t>
-            </a:r>
-            <a:r>
-              <a:rPr lang="en-US" sz="1400" dirty="0" err="1" smtClean="0">
-                <a:solidFill>
-                  <a:schemeClr val="accent5">
-                    <a:lumMod val="75000"/>
-                  </a:schemeClr>
-                </a:solidFill>
-              </a:rPr>
-              <a:t>corr</a:t>
-            </a:r>
-            <a:r>
-              <a:rPr lang="en-US" sz="1400" dirty="0" smtClean="0">
-                <a:solidFill>
-                  <a:schemeClr val="accent5">
-                    <a:lumMod val="75000"/>
-                  </a:schemeClr>
-                </a:solidFill>
-              </a:rPr>
-              <a:t> files</a:t>
+              <a:t>look up .corr files</a:t>
             </a:r>
             <a:endParaRPr lang="en-US" sz="1400" dirty="0">
               <a:solidFill>
@@ -16378,7 +16226,7 @@
         </p:nvSpPr>
         <p:spPr>
           <a:xfrm>
-            <a:off x="5547670" y="3855376"/>
+            <a:off x="5704838" y="3583904"/>
             <a:ext cx="1032141" cy="523220"/>
           </a:xfrm>
           <a:prstGeom prst="rect">
@@ -16395,11 +16243,7 @@
             <a:pPr algn="ctr"/>
             <a:r>
               <a:rPr lang="en-US" sz="1400" dirty="0" smtClean="0"/>
-              <a:t>attention </a:t>
-            </a:r>
-            <a:r>
-              <a:rPr lang="en-US" sz="1400" dirty="0" smtClean="0"/>
-              <a:t>network </a:t>
+              <a:t>attention network </a:t>
             </a:r>
             <a:endParaRPr lang="en-US" sz="1400" dirty="0"/>
           </a:p>
@@ -16415,7 +16259,7 @@
         </p:nvCxnSpPr>
         <p:spPr>
           <a:xfrm flipV="1">
-            <a:off x="2791522" y="3085036"/>
+            <a:off x="2948690" y="2813564"/>
             <a:ext cx="1519742" cy="822395"/>
           </a:xfrm>
           <a:prstGeom prst="bentConnector3">
@@ -16450,14 +16294,15 @@
         </p:nvCxnSpPr>
         <p:spPr>
           <a:xfrm flipH="1" flipV="1">
-            <a:off x="3551393" y="2793529"/>
+            <a:off x="3694273" y="2522057"/>
             <a:ext cx="1896" cy="295724"/>
           </a:xfrm>
           <a:prstGeom prst="straightConnector1">
             <a:avLst/>
           </a:prstGeom>
           <a:ln>
-            <a:tailEnd type="triangle"/>
+            <a:headEnd type="none" w="med" len="med"/>
+            <a:tailEnd type="none" w="med" len="med"/>
           </a:ln>
         </p:spPr>
         <p:style>
@@ -16483,7 +16328,7 @@
         </p:nvSpPr>
         <p:spPr>
           <a:xfrm>
-            <a:off x="197992" y="4190094"/>
+            <a:off x="355160" y="3918622"/>
             <a:ext cx="1937485" cy="523220"/>
           </a:xfrm>
           <a:prstGeom prst="rect">
@@ -16513,7 +16358,7 @@
         </p:nvSpPr>
         <p:spPr>
           <a:xfrm>
-            <a:off x="168012" y="4930266"/>
+            <a:off x="325180" y="4658794"/>
             <a:ext cx="2168788" cy="1384995"/>
           </a:xfrm>
           <a:prstGeom prst="rect">
@@ -16529,10 +16374,7 @@
             <a:r>
               <a:rPr lang="en-US" sz="1400" dirty="0" smtClean="0">
                 <a:solidFill>
-                  <a:schemeClr val="tx1">
-                    <a:lumMod val="50000"/>
-                    <a:lumOff val="50000"/>
-                  </a:schemeClr>
+                  <a:sysClr val="windowText" lastClr="000000"/>
                 </a:solidFill>
                 <a:latin typeface="Helvetica Neue" charset="0"/>
               </a:rPr>
@@ -16541,10 +16383,7 @@
             <a:r>
               <a:rPr lang="en-US" sz="1400" dirty="0">
                 <a:solidFill>
-                  <a:schemeClr val="tx1">
-                    <a:lumMod val="50000"/>
-                    <a:lumOff val="50000"/>
-                  </a:schemeClr>
+                  <a:sysClr val="windowText" lastClr="000000"/>
                 </a:solidFill>
                 <a:latin typeface="Helvetica Neue" charset="0"/>
               </a:rPr>
@@ -16553,10 +16392,7 @@
             <a:r>
               <a:rPr lang="en-US" sz="1400" dirty="0" smtClean="0">
                 <a:solidFill>
-                  <a:schemeClr val="tx1">
-                    <a:lumMod val="50000"/>
-                    <a:lumOff val="50000"/>
-                  </a:schemeClr>
+                  <a:sysClr val="windowText" lastClr="000000"/>
                 </a:solidFill>
                 <a:latin typeface="Helvetica Neue" charset="0"/>
               </a:rPr>
@@ -16565,10 +16401,7 @@
             <a:r>
               <a:rPr lang="en-US" sz="1400" dirty="0">
                 <a:solidFill>
-                  <a:schemeClr val="tx1">
-                    <a:lumMod val="50000"/>
-                    <a:lumOff val="50000"/>
-                  </a:schemeClr>
+                  <a:sysClr val="windowText" lastClr="000000"/>
                 </a:solidFill>
                 <a:latin typeface="Helvetica Neue" charset="0"/>
               </a:rPr>
@@ -16579,10 +16412,7 @@
             <a:r>
               <a:rPr lang="en-US" sz="1400" dirty="0" smtClean="0">
                 <a:solidFill>
-                  <a:schemeClr val="tx1">
-                    <a:lumMod val="50000"/>
-                    <a:lumOff val="50000"/>
-                  </a:schemeClr>
+                  <a:sysClr val="windowText" lastClr="000000"/>
                 </a:solidFill>
                 <a:latin typeface="Helvetica Neue" charset="0"/>
               </a:rPr>
@@ -16591,10 +16421,7 @@
             <a:r>
               <a:rPr lang="en-US" sz="1400" dirty="0">
                 <a:solidFill>
-                  <a:schemeClr val="tx1">
-                    <a:lumMod val="50000"/>
-                    <a:lumOff val="50000"/>
-                  </a:schemeClr>
+                  <a:sysClr val="windowText" lastClr="000000"/>
                 </a:solidFill>
                 <a:latin typeface="Helvetica Neue" charset="0"/>
               </a:rPr>
@@ -16603,10 +16430,7 @@
             <a:r>
               <a:rPr lang="en-US" sz="1400" dirty="0" smtClean="0">
                 <a:solidFill>
-                  <a:schemeClr val="tx1">
-                    <a:lumMod val="50000"/>
-                    <a:lumOff val="50000"/>
-                  </a:schemeClr>
+                  <a:sysClr val="windowText" lastClr="000000"/>
                 </a:solidFill>
                 <a:latin typeface="Helvetica Neue" charset="0"/>
               </a:rPr>
@@ -16614,10 +16438,7 @@
             </a:r>
             <a:endParaRPr lang="en-US" sz="1400" dirty="0">
               <a:solidFill>
-                <a:schemeClr val="tx1">
-                  <a:lumMod val="50000"/>
-                  <a:lumOff val="50000"/>
-                </a:schemeClr>
+                <a:sysClr val="windowText" lastClr="000000"/>
               </a:solidFill>
               <a:effectLst/>
               <a:latin typeface="Helvetica Neue" charset="0"/>
@@ -16633,7 +16454,7 @@
         </p:nvSpPr>
         <p:spPr>
           <a:xfrm>
-            <a:off x="2506273" y="4931789"/>
+            <a:off x="2663441" y="4660317"/>
             <a:ext cx="1984331" cy="1169551"/>
           </a:xfrm>
           <a:prstGeom prst="rect">
@@ -16674,22 +16495,40 @@
               <a:rPr lang="en-US" sz="1400" b="1" dirty="0">
                 <a:latin typeface="Helvetica Neue" charset="0"/>
               </a:rPr>
-              <a:t>parallel model</a:t>
+              <a:t>parallel </a:t>
+            </a:r>
+            <a:r>
+              <a:rPr lang="en-US" sz="1400" b="1" dirty="0" smtClean="0">
+                <a:latin typeface="Helvetica Neue" charset="0"/>
+              </a:rPr>
+              <a:t>mode</a:t>
+            </a:r>
+            <a:r>
+              <a:rPr lang="en-US" sz="1400" dirty="0" smtClean="0">
+                <a:latin typeface="Helvetica Neue" charset="0"/>
+              </a:rPr>
+              <a:t> </a:t>
             </a:r>
             <a:r>
               <a:rPr lang="en-US" sz="1400" dirty="0">
                 <a:latin typeface="Helvetica Neue" charset="0"/>
               </a:rPr>
-              <a:t> and </a:t>
+              <a:t>and </a:t>
             </a:r>
             <a:r>
               <a:rPr lang="en-US" sz="1400" b="1" dirty="0">
                 <a:latin typeface="Helvetica Neue" charset="0"/>
               </a:rPr>
-              <a:t>X model</a:t>
-            </a:r>
-            <a:r>
-              <a:rPr lang="en-US" sz="1400" dirty="0">
+              <a:t>X </a:t>
+            </a:r>
+            <a:r>
+              <a:rPr lang="en-US" sz="1400" b="1" dirty="0" smtClean="0">
+                <a:latin typeface="Helvetica Neue" charset="0"/>
+              </a:rPr>
+              <a:t>mode</a:t>
+            </a:r>
+            <a:r>
+              <a:rPr lang="en-US" sz="1400" dirty="0" smtClean="0">
                 <a:latin typeface="Helvetica Neue" charset="0"/>
               </a:rPr>
               <a:t>)</a:t>
@@ -16709,8 +16548,8 @@
         </p:nvSpPr>
         <p:spPr>
           <a:xfrm>
-            <a:off x="7002794" y="2945139"/>
-            <a:ext cx="1626638" cy="307777"/>
+            <a:off x="7059451" y="2673667"/>
+            <a:ext cx="1727149" cy="307777"/>
           </a:xfrm>
           <a:prstGeom prst="rect">
             <a:avLst/>
@@ -16730,8 +16569,12 @@
           <a:p>
             <a:pPr algn="ctr"/>
             <a:r>
+              <a:rPr lang="en-US" sz="1400" smtClean="0"/>
+              <a:t>SQL Logical </a:t>
+            </a:r>
+            <a:r>
               <a:rPr lang="en-US" sz="1400" dirty="0" smtClean="0"/>
-              <a:t>Logical template</a:t>
+              <a:t>template</a:t>
             </a:r>
             <a:endParaRPr lang="en-US" sz="1400" dirty="0"/>
           </a:p>
@@ -16745,7 +16588,7 @@
         </p:nvSpPr>
         <p:spPr>
           <a:xfrm>
-            <a:off x="5061287" y="4928768"/>
+            <a:off x="5218455" y="4657296"/>
             <a:ext cx="2085884" cy="523220"/>
           </a:xfrm>
           <a:prstGeom prst="rect">
@@ -16791,7 +16634,7 @@
         </p:nvSpPr>
         <p:spPr>
           <a:xfrm>
-            <a:off x="7261940" y="4928768"/>
+            <a:off x="7419108" y="4657296"/>
             <a:ext cx="2224814" cy="738664"/>
           </a:xfrm>
           <a:prstGeom prst="rect">
@@ -16837,7 +16680,7 @@
         </p:nvSpPr>
         <p:spPr>
           <a:xfrm>
-            <a:off x="9449123" y="4927590"/>
+            <a:off x="9606291" y="4656118"/>
             <a:ext cx="2199641" cy="307777"/>
           </a:xfrm>
           <a:prstGeom prst="rect">
@@ -16853,10 +16696,7 @@
             <a:r>
               <a:rPr lang="en-US" sz="1400" dirty="0">
                 <a:solidFill>
-                  <a:schemeClr val="tx1">
-                    <a:lumMod val="50000"/>
-                    <a:lumOff val="50000"/>
-                  </a:schemeClr>
+                  <a:sysClr val="windowText" lastClr="000000"/>
                 </a:solidFill>
                 <a:latin typeface="Helvetica Neue" charset="0"/>
               </a:rPr>
@@ -16865,10 +16705,7 @@
             <a:r>
               <a:rPr lang="en-US" sz="1400" dirty="0" smtClean="0">
                 <a:solidFill>
-                  <a:schemeClr val="tx1">
-                    <a:lumMod val="50000"/>
-                    <a:lumOff val="50000"/>
-                  </a:schemeClr>
+                  <a:sysClr val="windowText" lastClr="000000"/>
                 </a:solidFill>
                 <a:latin typeface="Helvetica Neue" charset="0"/>
               </a:rPr>
@@ -16877,10 +16714,7 @@
             <a:r>
               <a:rPr lang="en-US" sz="1400" dirty="0">
                 <a:solidFill>
-                  <a:schemeClr val="tx1">
-                    <a:lumMod val="50000"/>
-                    <a:lumOff val="50000"/>
-                  </a:schemeClr>
+                  <a:sysClr val="windowText" lastClr="000000"/>
                 </a:solidFill>
                 <a:latin typeface="Helvetica Neue" charset="0"/>
               </a:rPr>
@@ -16888,10 +16722,7 @@
             </a:r>
             <a:endParaRPr lang="en-US" sz="1400" dirty="0">
               <a:solidFill>
-                <a:schemeClr val="tx1">
-                  <a:lumMod val="50000"/>
-                  <a:lumOff val="50000"/>
-                </a:schemeClr>
+                <a:sysClr val="windowText" lastClr="000000"/>
               </a:solidFill>
               <a:effectLst/>
               <a:latin typeface="Helvetica Neue" charset="0"/>
@@ -16910,16 +16741,17 @@
         </p:nvCxnSpPr>
         <p:spPr>
           <a:xfrm rot="5400000" flipH="1">
-            <a:off x="6299747" y="1736550"/>
-            <a:ext cx="13992" cy="3018741"/>
+            <a:off x="6431787" y="1490205"/>
+            <a:ext cx="13992" cy="2968486"/>
           </a:xfrm>
           <a:prstGeom prst="bentConnector3">
             <a:avLst>
-              <a:gd name="adj1" fmla="val -9984305"/>
+              <a:gd name="adj1" fmla="val -3573921"/>
             </a:avLst>
           </a:prstGeom>
           <a:ln>
-            <a:tailEnd type="triangle"/>
+            <a:headEnd type="triangle" w="med" len="med"/>
+            <a:tailEnd type="triangle" w="med" len="med"/>
           </a:ln>
         </p:spPr>
         <p:style>
@@ -17758,15 +17590,7 @@
           <a:p>
             <a:r>
               <a:rPr lang="en-US" b="1" dirty="0" smtClean="0"/>
-              <a:t>(.</a:t>
-            </a:r>
-            <a:r>
-              <a:rPr lang="en-US" b="1" dirty="0" err="1" smtClean="0"/>
-              <a:t>qu</a:t>
-            </a:r>
-            <a:r>
-              <a:rPr lang="en-US" b="1" dirty="0" smtClean="0"/>
-              <a:t>)</a:t>
+              <a:t>(.qu)</a:t>
             </a:r>
             <a:endParaRPr lang="en-US" b="1" dirty="0"/>
           </a:p>
@@ -17796,11 +17620,7 @@
           <a:p>
             <a:r>
               <a:rPr lang="en-US" b="1" dirty="0" smtClean="0"/>
-              <a:t>.</a:t>
-            </a:r>
-            <a:r>
-              <a:rPr lang="en-US" b="1" dirty="0" err="1" smtClean="0"/>
-              <a:t>ficorr</a:t>
+              <a:t>.ficorr</a:t>
             </a:r>
             <a:endParaRPr lang="en-US" b="1" dirty="0"/>
           </a:p>
@@ -17830,11 +17650,7 @@
           <a:p>
             <a:r>
               <a:rPr lang="en-US" b="1" dirty="0" smtClean="0"/>
-              <a:t>.</a:t>
-            </a:r>
-            <a:r>
-              <a:rPr lang="en-US" b="1" dirty="0" err="1" smtClean="0"/>
-              <a:t>vacorr</a:t>
+              <a:t>.vacorr</a:t>
             </a:r>
             <a:endParaRPr lang="en-US" b="1" dirty="0"/>
           </a:p>
@@ -18600,11 +18416,7 @@
           <a:p>
             <a:r>
               <a:rPr lang="en-US" sz="2400" dirty="0" smtClean="0"/>
-              <a:t>Query Optimization (Tagging</a:t>
-            </a:r>
-            <a:r>
-              <a:rPr lang="en-US" sz="2400" dirty="0" smtClean="0"/>
-              <a:t>) --- dealing with overlapping value domain</a:t>
+              <a:t>Query Optimization (Tagging) --- dealing with overlapping value domain</a:t>
             </a:r>
             <a:endParaRPr lang="en-US" sz="2400" dirty="0"/>
           </a:p>
@@ -18966,11 +18778,7 @@
             </a:r>
             <a:r>
               <a:rPr lang="en-US" dirty="0" smtClean="0"/>
-              <a:t> </a:t>
-            </a:r>
-            <a:r>
-              <a:rPr lang="en-US" dirty="0" smtClean="0"/>
-              <a:t>Dependency Tree Lowest common ancestor (</a:t>
+              <a:t> Dependency Tree Lowest common ancestor (</a:t>
             </a:r>
             <a:r>
               <a:rPr lang="en-US" dirty="0" err="1" smtClean="0"/>
@@ -19038,7 +18846,7 @@
               <a:t> was </a:t>
             </a:r>
             <a:r>
-              <a:rPr lang="en-US" u="sng" dirty="0" err="1">
+              <a:rPr lang="en-US" u="sng" dirty="0">
                 <a:solidFill>
                   <a:srgbClr val="FF0000"/>
                 </a:solidFill>
@@ -19074,7 +18882,7 @@
               <a:t> was </a:t>
             </a:r>
             <a:r>
-              <a:rPr lang="en-US" u="sng" dirty="0" err="1">
+              <a:rPr lang="en-US" u="sng" dirty="0">
                 <a:solidFill>
                   <a:srgbClr val="FF0000"/>
                 </a:solidFill>
@@ -19327,72 +19135,18 @@
                 </a:solidFill>
                 <a:latin typeface="Menlo" charset="0"/>
               </a:rPr>
-              <a:t>when the 1st_venue was </a:t>
-            </a:r>
-            <a:r>
-              <a:rPr lang="en-US" sz="1400" dirty="0" err="1">
+              <a:t>when the 1st_venue was beijing and 2nd_venue was dubai, which city was the most recent 3rd_venue</a:t>
+            </a:r>
+          </a:p>
+          <a:p>
+            <a:r>
+              <a:rPr lang="en-US" sz="1400" dirty="0">
                 <a:solidFill>
                   <a:srgbClr val="000000"/>
                 </a:solidFill>
                 <a:latin typeface="Menlo" charset="0"/>
               </a:rPr>
-              <a:t>beijing</a:t>
-            </a:r>
-            <a:r>
-              <a:rPr lang="en-US" sz="1400" dirty="0">
-                <a:solidFill>
-                  <a:srgbClr val="000000"/>
-                </a:solidFill>
-                <a:latin typeface="Menlo" charset="0"/>
-              </a:rPr>
-              <a:t> and 2nd_venue was </a:t>
-            </a:r>
-            <a:r>
-              <a:rPr lang="en-US" sz="1400" dirty="0" err="1">
-                <a:solidFill>
-                  <a:srgbClr val="000000"/>
-                </a:solidFill>
-                <a:latin typeface="Menlo" charset="0"/>
-              </a:rPr>
-              <a:t>dubai</a:t>
-            </a:r>
-            <a:r>
-              <a:rPr lang="en-US" sz="1400" dirty="0">
-                <a:solidFill>
-                  <a:srgbClr val="000000"/>
-                </a:solidFill>
-                <a:latin typeface="Menlo" charset="0"/>
-              </a:rPr>
-              <a:t>, which city was the most recent 3rd_venue</a:t>
-            </a:r>
-          </a:p>
-          <a:p>
-            <a:r>
-              <a:rPr lang="en-US" sz="1400" dirty="0">
-                <a:solidFill>
-                  <a:srgbClr val="000000"/>
-                </a:solidFill>
-                <a:latin typeface="Menlo" charset="0"/>
-              </a:rPr>
-              <a:t>select 3rd_Venue </a:t>
-            </a:r>
-            <a:r>
-              <a:rPr lang="en-US" sz="1400" dirty="0" err="1">
-                <a:solidFill>
-                  <a:srgbClr val="000000"/>
-                </a:solidFill>
-                <a:latin typeface="Menlo" charset="0"/>
-              </a:rPr>
-              <a:t>argmax</a:t>
-            </a:r>
-            <a:r>
-              <a:rPr lang="en-US" sz="1400" dirty="0">
-                <a:solidFill>
-                  <a:srgbClr val="000000"/>
-                </a:solidFill>
-                <a:latin typeface="Menlo" charset="0"/>
-              </a:rPr>
-              <a:t> Year where 1st_Venue equal Beijing and 2nd_Venue equal Dubai</a:t>
+              <a:t>select 3rd_Venue argmax Year where 1st_Venue equal Beijing and 2nd_Venue equal Dubai</a:t>
             </a:r>
           </a:p>
           <a:p>
@@ -19560,17 +19314,21 @@
                 </a:solidFill>
                 <a:latin typeface="Menlo" charset="0"/>
               </a:rPr>
-              <a:t>&lt;nan&gt; </a:t>
-            </a:r>
-            <a:r>
-              <a:rPr lang="en-US" sz="1400" dirty="0" err="1">
+              <a:t>&lt;nan&gt; beijing dubai &lt;nan&gt; &lt;nan&gt;</a:t>
+            </a:r>
+          </a:p>
+          <a:p>
+            <a:r>
+              <a:rPr lang="en-US" sz="1400" dirty="0">
                 <a:solidFill>
                   <a:srgbClr val="000000"/>
                 </a:solidFill>
                 <a:latin typeface="Menlo" charset="0"/>
               </a:rPr>
-              <a:t>beijing</a:t>
-            </a:r>
+              <a:t>&lt;field&gt;:0 &lt;nan&gt; &lt;field&gt;:1 &lt;nan&gt; &lt;value&gt;:1 &lt;nan&gt; &lt;field&gt;:2 &lt;nan&gt; &lt;value&gt;:2 &lt;nan&gt; &lt;nan&gt; &lt;field&gt;:3 &lt;nan&gt; &lt;nan&gt; &lt;nan&gt; &lt;nan&gt; &lt;field&gt;:4</a:t>
+            </a:r>
+          </a:p>
+          <a:p>
             <a:r>
               <a:rPr lang="en-US" sz="1400" dirty="0">
                 <a:solidFill>
@@ -19578,76 +19336,18 @@
                 </a:solidFill>
                 <a:latin typeface="Menlo" charset="0"/>
               </a:rPr>
-              <a:t> </a:t>
-            </a:r>
-            <a:r>
-              <a:rPr lang="en-US" sz="1400" dirty="0" err="1">
+              <a:t>&lt;field&gt;:0 the &lt;field&gt;:1 was &lt;value&gt;:1 and &lt;field&gt;:2 was &lt;value&gt;:2 , which &lt;field&gt;:3 was the most recent &lt;field&gt;:4</a:t>
+            </a:r>
+          </a:p>
+          <a:p>
+            <a:r>
+              <a:rPr lang="en-US" sz="1400" dirty="0">
                 <a:solidFill>
                   <a:srgbClr val="000000"/>
                 </a:solidFill>
                 <a:latin typeface="Menlo" charset="0"/>
               </a:rPr>
-              <a:t>dubai</a:t>
-            </a:r>
-            <a:r>
-              <a:rPr lang="en-US" sz="1400" dirty="0">
-                <a:solidFill>
-                  <a:srgbClr val="000000"/>
-                </a:solidFill>
-                <a:latin typeface="Menlo" charset="0"/>
-              </a:rPr>
-              <a:t> &lt;nan&gt; &lt;nan&gt;</a:t>
-            </a:r>
-          </a:p>
-          <a:p>
-            <a:r>
-              <a:rPr lang="en-US" sz="1400" dirty="0">
-                <a:solidFill>
-                  <a:srgbClr val="000000"/>
-                </a:solidFill>
-                <a:latin typeface="Menlo" charset="0"/>
-              </a:rPr>
-              <a:t>&lt;field&gt;:0 &lt;nan&gt; &lt;field&gt;:1 &lt;nan&gt; &lt;value&gt;:1 &lt;nan&gt; &lt;field&gt;:2 &lt;nan&gt; &lt;value&gt;:2 &lt;nan&gt; &lt;nan&gt; &lt;field&gt;:3 &lt;nan&gt; &lt;nan&gt; &lt;nan&gt; &lt;nan&gt; &lt;field&gt;:4</a:t>
-            </a:r>
-          </a:p>
-          <a:p>
-            <a:r>
-              <a:rPr lang="en-US" sz="1400" dirty="0">
-                <a:solidFill>
-                  <a:srgbClr val="000000"/>
-                </a:solidFill>
-                <a:latin typeface="Menlo" charset="0"/>
-              </a:rPr>
-              <a:t>&lt;field&gt;:0 the &lt;field&gt;:1 was &lt;value&gt;:1 and &lt;field&gt;:2 was &lt;value&gt;:2 , which &lt;field&gt;:3 was the most recent &lt;field&gt;:4</a:t>
-            </a:r>
-          </a:p>
-          <a:p>
-            <a:r>
-              <a:rPr lang="en-US" sz="1400" dirty="0">
-                <a:solidFill>
-                  <a:srgbClr val="000000"/>
-                </a:solidFill>
-                <a:latin typeface="Menlo" charset="0"/>
-              </a:rPr>
-              <a:t>select &lt;field&gt;:4 </a:t>
-            </a:r>
-            <a:r>
-              <a:rPr lang="en-US" sz="1400" dirty="0" err="1">
-                <a:solidFill>
-                  <a:srgbClr val="000000"/>
-                </a:solidFill>
-                <a:latin typeface="Menlo" charset="0"/>
-              </a:rPr>
-              <a:t>argmax</a:t>
-            </a:r>
-            <a:r>
-              <a:rPr lang="en-US" sz="1400" dirty="0">
-                <a:solidFill>
-                  <a:srgbClr val="000000"/>
-                </a:solidFill>
-                <a:latin typeface="Menlo" charset="0"/>
-              </a:rPr>
-              <a:t> &lt;field&gt;:0 where &lt;field&gt;:1 equal &lt;value&gt;:1 and &lt;field&gt;:2 equal &lt;value&gt;:2</a:t>
+              <a:t>select &lt;field&gt;:4 argmax &lt;field&gt;:0 where &lt;field&gt;:1 equal &lt;value&gt;:1 and &lt;field&gt;:2 equal &lt;value&gt;:2</a:t>
             </a:r>
             <a:endParaRPr lang="en-US" sz="1400" dirty="0">
               <a:solidFill>
@@ -20010,19 +19710,7 @@
           <a:p>
             <a:r>
               <a:rPr lang="en-US" sz="2400" dirty="0" smtClean="0"/>
-              <a:t>feature </a:t>
-            </a:r>
-            <a:r>
-              <a:rPr lang="en-US" sz="2400" dirty="0" smtClean="0"/>
-              <a:t>vector for </a:t>
-            </a:r>
-            <a:r>
-              <a:rPr lang="en-US" sz="2400" dirty="0" smtClean="0"/>
-              <a:t>‘tag’ </a:t>
-            </a:r>
-            <a:r>
-              <a:rPr lang="en-US" sz="2400" dirty="0" smtClean="0"/>
-              <a:t>:</a:t>
+              <a:t>feature vector for ‘tag’ :</a:t>
             </a:r>
             <a:r>
               <a:rPr lang="zh-CN" altLang="en-US" sz="2400" dirty="0" smtClean="0"/>

</xml_diff>